<commit_message>
Verder gewerkt aan PP
</commit_message>
<xml_diff>
--- a/Presentatie/Camunda_Brooks_JDI.pptx
+++ b/Presentatie/Camunda_Brooks_JDI.pptx
@@ -12,6 +12,11 @@
     <p:sldId id="261" r:id="rId6"/>
     <p:sldId id="262" r:id="rId7"/>
     <p:sldId id="263" r:id="rId8"/>
+    <p:sldId id="264" r:id="rId9"/>
+    <p:sldId id="265" r:id="rId10"/>
+    <p:sldId id="266" r:id="rId11"/>
+    <p:sldId id="267" r:id="rId12"/>
+    <p:sldId id="268" r:id="rId13"/>
   </p:sldIdLst>
   <p:sldSz cx="12192000" cy="6858000"/>
   <p:notesSz cx="6858000" cy="9144000"/>
@@ -110,6 +115,11 @@
       </a:defRPr>
     </a:lvl9pPr>
   </p:defaultTextStyle>
+  <p:extLst>
+    <p:ext uri="{EFAFB233-063F-42B5-8137-9DF3F51BA10A}">
+      <p15:sldGuideLst xmlns:p15="http://schemas.microsoft.com/office/powerpoint/2012/main"/>
+    </p:ext>
+  </p:extLst>
 </p:presentation>
 </file>
 
@@ -262,7 +272,7 @@
           <a:p>
             <a:fld id="{6CA48DFA-0712-4034-9BD2-F4238B581074}" type="datetimeFigureOut">
               <a:rPr lang="en-NL" smtClean="0"/>
-              <a:t>02/02/2022</a:t>
+              <a:t>05/02/2022</a:t>
             </a:fld>
             <a:endParaRPr lang="en-NL"/>
           </a:p>
@@ -462,7 +472,7 @@
           <a:p>
             <a:fld id="{6CA48DFA-0712-4034-9BD2-F4238B581074}" type="datetimeFigureOut">
               <a:rPr lang="en-NL" smtClean="0"/>
-              <a:t>02/02/2022</a:t>
+              <a:t>05/02/2022</a:t>
             </a:fld>
             <a:endParaRPr lang="en-NL"/>
           </a:p>
@@ -672,7 +682,7 @@
           <a:p>
             <a:fld id="{6CA48DFA-0712-4034-9BD2-F4238B581074}" type="datetimeFigureOut">
               <a:rPr lang="en-NL" smtClean="0"/>
-              <a:t>02/02/2022</a:t>
+              <a:t>05/02/2022</a:t>
             </a:fld>
             <a:endParaRPr lang="en-NL"/>
           </a:p>
@@ -872,7 +882,7 @@
           <a:p>
             <a:fld id="{6CA48DFA-0712-4034-9BD2-F4238B581074}" type="datetimeFigureOut">
               <a:rPr lang="en-NL" smtClean="0"/>
-              <a:t>02/02/2022</a:t>
+              <a:t>05/02/2022</a:t>
             </a:fld>
             <a:endParaRPr lang="en-NL"/>
           </a:p>
@@ -1148,7 +1158,7 @@
           <a:p>
             <a:fld id="{6CA48DFA-0712-4034-9BD2-F4238B581074}" type="datetimeFigureOut">
               <a:rPr lang="en-NL" smtClean="0"/>
-              <a:t>02/02/2022</a:t>
+              <a:t>05/02/2022</a:t>
             </a:fld>
             <a:endParaRPr lang="en-NL"/>
           </a:p>
@@ -1416,7 +1426,7 @@
           <a:p>
             <a:fld id="{6CA48DFA-0712-4034-9BD2-F4238B581074}" type="datetimeFigureOut">
               <a:rPr lang="en-NL" smtClean="0"/>
-              <a:t>02/02/2022</a:t>
+              <a:t>05/02/2022</a:t>
             </a:fld>
             <a:endParaRPr lang="en-NL"/>
           </a:p>
@@ -1831,7 +1841,7 @@
           <a:p>
             <a:fld id="{6CA48DFA-0712-4034-9BD2-F4238B581074}" type="datetimeFigureOut">
               <a:rPr lang="en-NL" smtClean="0"/>
-              <a:t>02/02/2022</a:t>
+              <a:t>05/02/2022</a:t>
             </a:fld>
             <a:endParaRPr lang="en-NL"/>
           </a:p>
@@ -1973,7 +1983,7 @@
           <a:p>
             <a:fld id="{6CA48DFA-0712-4034-9BD2-F4238B581074}" type="datetimeFigureOut">
               <a:rPr lang="en-NL" smtClean="0"/>
-              <a:t>02/02/2022</a:t>
+              <a:t>05/02/2022</a:t>
             </a:fld>
             <a:endParaRPr lang="en-NL"/>
           </a:p>
@@ -2086,7 +2096,7 @@
           <a:p>
             <a:fld id="{6CA48DFA-0712-4034-9BD2-F4238B581074}" type="datetimeFigureOut">
               <a:rPr lang="en-NL" smtClean="0"/>
-              <a:t>02/02/2022</a:t>
+              <a:t>05/02/2022</a:t>
             </a:fld>
             <a:endParaRPr lang="en-NL"/>
           </a:p>
@@ -2399,7 +2409,7 @@
           <a:p>
             <a:fld id="{6CA48DFA-0712-4034-9BD2-F4238B581074}" type="datetimeFigureOut">
               <a:rPr lang="en-NL" smtClean="0"/>
-              <a:t>02/02/2022</a:t>
+              <a:t>05/02/2022</a:t>
             </a:fld>
             <a:endParaRPr lang="en-NL"/>
           </a:p>
@@ -2688,7 +2698,7 @@
           <a:p>
             <a:fld id="{6CA48DFA-0712-4034-9BD2-F4238B581074}" type="datetimeFigureOut">
               <a:rPr lang="en-NL" smtClean="0"/>
-              <a:t>02/02/2022</a:t>
+              <a:t>05/02/2022</a:t>
             </a:fld>
             <a:endParaRPr lang="en-NL"/>
           </a:p>
@@ -2931,7 +2941,7 @@
           <a:p>
             <a:fld id="{6CA48DFA-0712-4034-9BD2-F4238B581074}" type="datetimeFigureOut">
               <a:rPr lang="en-NL" smtClean="0"/>
-              <a:t>02/02/2022</a:t>
+              <a:t>05/02/2022</a:t>
             </a:fld>
             <a:endParaRPr lang="en-NL"/>
           </a:p>
@@ -3412,6 +3422,304 @@
     <p:extLst>
       <p:ext uri="{BB962C8B-B14F-4D97-AF65-F5344CB8AC3E}">
         <p14:creationId xmlns:p14="http://schemas.microsoft.com/office/powerpoint/2010/main" val="1054655865"/>
+      </p:ext>
+    </p:extLst>
+  </p:cSld>
+  <p:clrMapOvr>
+    <a:masterClrMapping/>
+  </p:clrMapOvr>
+</p:sld>
+</file>
+
+<file path=ppt/slides/slide10.xml><?xml version="1.0" encoding="utf-8"?>
+<p:sld xmlns:a="http://schemas.openxmlformats.org/drawingml/2006/main" xmlns:r="http://schemas.openxmlformats.org/officeDocument/2006/relationships" xmlns:p="http://schemas.openxmlformats.org/presentationml/2006/main">
+  <p:cSld>
+    <p:spTree>
+      <p:nvGrpSpPr>
+        <p:cNvPr id="1" name=""/>
+        <p:cNvGrpSpPr/>
+        <p:nvPr/>
+      </p:nvGrpSpPr>
+      <p:grpSpPr>
+        <a:xfrm>
+          <a:off x="0" y="0"/>
+          <a:ext cx="0" cy="0"/>
+          <a:chOff x="0" y="0"/>
+          <a:chExt cx="0" cy="0"/>
+        </a:xfrm>
+      </p:grpSpPr>
+      <p:sp>
+        <p:nvSpPr>
+          <p:cNvPr id="2" name="Title 1">
+            <a:extLst>
+              <a:ext uri="{FF2B5EF4-FFF2-40B4-BE49-F238E27FC236}">
+                <a16:creationId xmlns:a16="http://schemas.microsoft.com/office/drawing/2014/main" id="{E23CE00E-E6D1-47F2-9FE9-F298BD88172F}"/>
+              </a:ext>
+            </a:extLst>
+          </p:cNvPr>
+          <p:cNvSpPr>
+            <a:spLocks noGrp="1"/>
+          </p:cNvSpPr>
+          <p:nvPr>
+            <p:ph type="title"/>
+          </p:nvPr>
+        </p:nvSpPr>
+        <p:spPr/>
+        <p:txBody>
+          <a:bodyPr/>
+          <a:lstStyle/>
+          <a:p>
+            <a:endParaRPr lang="en-NL"/>
+          </a:p>
+        </p:txBody>
+      </p:sp>
+      <p:sp>
+        <p:nvSpPr>
+          <p:cNvPr id="3" name="Content Placeholder 2">
+            <a:extLst>
+              <a:ext uri="{FF2B5EF4-FFF2-40B4-BE49-F238E27FC236}">
+                <a16:creationId xmlns:a16="http://schemas.microsoft.com/office/drawing/2014/main" id="{B96AEF10-F14A-460F-9ABC-EE487BB74210}"/>
+              </a:ext>
+            </a:extLst>
+          </p:cNvPr>
+          <p:cNvSpPr>
+            <a:spLocks noGrp="1"/>
+          </p:cNvSpPr>
+          <p:nvPr>
+            <p:ph idx="1"/>
+          </p:nvPr>
+        </p:nvSpPr>
+        <p:spPr/>
+        <p:txBody>
+          <a:bodyPr/>
+          <a:lstStyle/>
+          <a:p>
+            <a:endParaRPr lang="en-NL"/>
+          </a:p>
+        </p:txBody>
+      </p:sp>
+      <p:pic>
+        <p:nvPicPr>
+          <p:cNvPr id="5" name="Picture 4">
+            <a:extLst>
+              <a:ext uri="{FF2B5EF4-FFF2-40B4-BE49-F238E27FC236}">
+                <a16:creationId xmlns:a16="http://schemas.microsoft.com/office/drawing/2014/main" id="{413DF749-8BFC-4FBE-9D31-0DBFCB3C6A18}"/>
+              </a:ext>
+            </a:extLst>
+          </p:cNvPr>
+          <p:cNvPicPr>
+            <a:picLocks noChangeAspect="1"/>
+          </p:cNvPicPr>
+          <p:nvPr/>
+        </p:nvPicPr>
+        <p:blipFill rotWithShape="1">
+          <a:blip r:embed="rId2"/>
+          <a:srcRect t="5155"/>
+          <a:stretch/>
+        </p:blipFill>
+        <p:spPr>
+          <a:xfrm>
+            <a:off x="-19925" y="873760"/>
+            <a:ext cx="12255454" cy="5984241"/>
+          </a:xfrm>
+          <a:prstGeom prst="rect">
+            <a:avLst/>
+          </a:prstGeom>
+        </p:spPr>
+      </p:pic>
+      <p:pic>
+        <p:nvPicPr>
+          <p:cNvPr id="6" name="Picture 5">
+            <a:extLst>
+              <a:ext uri="{FF2B5EF4-FFF2-40B4-BE49-F238E27FC236}">
+                <a16:creationId xmlns:a16="http://schemas.microsoft.com/office/drawing/2014/main" id="{57840CE1-999B-4851-94E0-E742E776D6C4}"/>
+              </a:ext>
+            </a:extLst>
+          </p:cNvPr>
+          <p:cNvPicPr>
+            <a:picLocks noChangeAspect="1"/>
+          </p:cNvPicPr>
+          <p:nvPr/>
+        </p:nvPicPr>
+        <p:blipFill rotWithShape="1">
+          <a:blip r:embed="rId3"/>
+          <a:srcRect l="19170" t="38569" r="73769" b="31037"/>
+          <a:stretch/>
+        </p:blipFill>
+        <p:spPr>
+          <a:xfrm>
+            <a:off x="5984240" y="41228"/>
+            <a:ext cx="833120" cy="1117600"/>
+          </a:xfrm>
+          <a:prstGeom prst="rect">
+            <a:avLst/>
+          </a:prstGeom>
+        </p:spPr>
+      </p:pic>
+    </p:spTree>
+    <p:extLst>
+      <p:ext uri="{BB962C8B-B14F-4D97-AF65-F5344CB8AC3E}">
+        <p14:creationId xmlns:p14="http://schemas.microsoft.com/office/powerpoint/2010/main" val="3803182237"/>
+      </p:ext>
+    </p:extLst>
+  </p:cSld>
+  <p:clrMapOvr>
+    <a:masterClrMapping/>
+  </p:clrMapOvr>
+</p:sld>
+</file>
+
+<file path=ppt/slides/slide11.xml><?xml version="1.0" encoding="utf-8"?>
+<p:sld xmlns:a="http://schemas.openxmlformats.org/drawingml/2006/main" xmlns:r="http://schemas.openxmlformats.org/officeDocument/2006/relationships" xmlns:p="http://schemas.openxmlformats.org/presentationml/2006/main">
+  <p:cSld>
+    <p:spTree>
+      <p:nvGrpSpPr>
+        <p:cNvPr id="1" name=""/>
+        <p:cNvGrpSpPr/>
+        <p:nvPr/>
+      </p:nvGrpSpPr>
+      <p:grpSpPr>
+        <a:xfrm>
+          <a:off x="0" y="0"/>
+          <a:ext cx="0" cy="0"/>
+          <a:chOff x="0" y="0"/>
+          <a:chExt cx="0" cy="0"/>
+        </a:xfrm>
+      </p:grpSpPr>
+      <p:sp>
+        <p:nvSpPr>
+          <p:cNvPr id="2" name="Title 1">
+            <a:extLst>
+              <a:ext uri="{FF2B5EF4-FFF2-40B4-BE49-F238E27FC236}">
+                <a16:creationId xmlns:a16="http://schemas.microsoft.com/office/drawing/2014/main" id="{95A9140B-8ED3-43BD-96B6-0340CC2A1DA1}"/>
+              </a:ext>
+            </a:extLst>
+          </p:cNvPr>
+          <p:cNvSpPr>
+            <a:spLocks noGrp="1"/>
+          </p:cNvSpPr>
+          <p:nvPr>
+            <p:ph type="title"/>
+          </p:nvPr>
+        </p:nvSpPr>
+        <p:spPr/>
+        <p:txBody>
+          <a:bodyPr/>
+          <a:lstStyle/>
+          <a:p>
+            <a:endParaRPr lang="en-NL"/>
+          </a:p>
+        </p:txBody>
+      </p:sp>
+      <p:sp>
+        <p:nvSpPr>
+          <p:cNvPr id="3" name="Content Placeholder 2">
+            <a:extLst>
+              <a:ext uri="{FF2B5EF4-FFF2-40B4-BE49-F238E27FC236}">
+                <a16:creationId xmlns:a16="http://schemas.microsoft.com/office/drawing/2014/main" id="{7FD349DE-7DE0-4B7C-879F-1E86F8C26213}"/>
+              </a:ext>
+            </a:extLst>
+          </p:cNvPr>
+          <p:cNvSpPr>
+            <a:spLocks noGrp="1"/>
+          </p:cNvSpPr>
+          <p:nvPr>
+            <p:ph idx="1"/>
+          </p:nvPr>
+        </p:nvSpPr>
+        <p:spPr/>
+        <p:txBody>
+          <a:bodyPr/>
+          <a:lstStyle/>
+          <a:p>
+            <a:endParaRPr lang="en-NL"/>
+          </a:p>
+        </p:txBody>
+      </p:sp>
+    </p:spTree>
+    <p:extLst>
+      <p:ext uri="{BB962C8B-B14F-4D97-AF65-F5344CB8AC3E}">
+        <p14:creationId xmlns:p14="http://schemas.microsoft.com/office/powerpoint/2010/main" val="3769305566"/>
+      </p:ext>
+    </p:extLst>
+  </p:cSld>
+  <p:clrMapOvr>
+    <a:masterClrMapping/>
+  </p:clrMapOvr>
+</p:sld>
+</file>
+
+<file path=ppt/slides/slide12.xml><?xml version="1.0" encoding="utf-8"?>
+<p:sld xmlns:a="http://schemas.openxmlformats.org/drawingml/2006/main" xmlns:r="http://schemas.openxmlformats.org/officeDocument/2006/relationships" xmlns:p="http://schemas.openxmlformats.org/presentationml/2006/main">
+  <p:cSld>
+    <p:spTree>
+      <p:nvGrpSpPr>
+        <p:cNvPr id="1" name=""/>
+        <p:cNvGrpSpPr/>
+        <p:nvPr/>
+      </p:nvGrpSpPr>
+      <p:grpSpPr>
+        <a:xfrm>
+          <a:off x="0" y="0"/>
+          <a:ext cx="0" cy="0"/>
+          <a:chOff x="0" y="0"/>
+          <a:chExt cx="0" cy="0"/>
+        </a:xfrm>
+      </p:grpSpPr>
+      <p:sp>
+        <p:nvSpPr>
+          <p:cNvPr id="2" name="Title 1">
+            <a:extLst>
+              <a:ext uri="{FF2B5EF4-FFF2-40B4-BE49-F238E27FC236}">
+                <a16:creationId xmlns:a16="http://schemas.microsoft.com/office/drawing/2014/main" id="{FDED7A59-D80F-4765-9E49-1A724E37D623}"/>
+              </a:ext>
+            </a:extLst>
+          </p:cNvPr>
+          <p:cNvSpPr>
+            <a:spLocks noGrp="1"/>
+          </p:cNvSpPr>
+          <p:nvPr>
+            <p:ph type="title"/>
+          </p:nvPr>
+        </p:nvSpPr>
+        <p:spPr/>
+        <p:txBody>
+          <a:bodyPr/>
+          <a:lstStyle/>
+          <a:p>
+            <a:endParaRPr lang="en-NL"/>
+          </a:p>
+        </p:txBody>
+      </p:sp>
+      <p:sp>
+        <p:nvSpPr>
+          <p:cNvPr id="3" name="Content Placeholder 2">
+            <a:extLst>
+              <a:ext uri="{FF2B5EF4-FFF2-40B4-BE49-F238E27FC236}">
+                <a16:creationId xmlns:a16="http://schemas.microsoft.com/office/drawing/2014/main" id="{135DBCD2-2CC4-4F89-BD9E-1AA97FD83ED3}"/>
+              </a:ext>
+            </a:extLst>
+          </p:cNvPr>
+          <p:cNvSpPr>
+            <a:spLocks noGrp="1"/>
+          </p:cNvSpPr>
+          <p:nvPr>
+            <p:ph idx="1"/>
+          </p:nvPr>
+        </p:nvSpPr>
+        <p:spPr/>
+        <p:txBody>
+          <a:bodyPr/>
+          <a:lstStyle/>
+          <a:p>
+            <a:endParaRPr lang="en-NL"/>
+          </a:p>
+        </p:txBody>
+      </p:sp>
+    </p:spTree>
+    <p:extLst>
+      <p:ext uri="{BB962C8B-B14F-4D97-AF65-F5344CB8AC3E}">
+        <p14:creationId xmlns:p14="http://schemas.microsoft.com/office/powerpoint/2010/main" val="4092034304"/>
       </p:ext>
     </p:extLst>
   </p:cSld>
@@ -5232,6 +5540,76 @@
           </a:p>
         </p:txBody>
       </p:sp>
+      <p:pic>
+        <p:nvPicPr>
+          <p:cNvPr id="3" name="Picture 2" descr="A picture containing graphical user interface&#10;&#10;Description automatically generated">
+            <a:extLst>
+              <a:ext uri="{FF2B5EF4-FFF2-40B4-BE49-F238E27FC236}">
+                <a16:creationId xmlns:a16="http://schemas.microsoft.com/office/drawing/2014/main" id="{5A02D9BF-DEB4-4DD4-9B8C-2F9B9ED94DC0}"/>
+              </a:ext>
+            </a:extLst>
+          </p:cNvPr>
+          <p:cNvPicPr>
+            <a:picLocks noChangeAspect="1"/>
+          </p:cNvPicPr>
+          <p:nvPr/>
+        </p:nvPicPr>
+        <p:blipFill rotWithShape="1">
+          <a:blip r:embed="rId2">
+            <a:extLst>
+              <a:ext uri="{28A0092B-C50C-407E-A947-70E740481C1C}">
+                <a14:useLocalDpi xmlns:a14="http://schemas.microsoft.com/office/drawing/2010/main" val="0"/>
+              </a:ext>
+            </a:extLst>
+          </a:blip>
+          <a:srcRect l="50000"/>
+          <a:stretch/>
+        </p:blipFill>
+        <p:spPr>
+          <a:xfrm>
+            <a:off x="6095999" y="2900361"/>
+            <a:ext cx="4773277" cy="2481263"/>
+          </a:xfrm>
+          <a:prstGeom prst="rect">
+            <a:avLst/>
+          </a:prstGeom>
+        </p:spPr>
+      </p:pic>
+      <p:pic>
+        <p:nvPicPr>
+          <p:cNvPr id="5" name="Picture 4" descr="A picture containing graphical user interface&#10;&#10;Description automatically generated">
+            <a:extLst>
+              <a:ext uri="{FF2B5EF4-FFF2-40B4-BE49-F238E27FC236}">
+                <a16:creationId xmlns:a16="http://schemas.microsoft.com/office/drawing/2014/main" id="{2E2A9321-BD69-456C-ADF7-637778760B65}"/>
+              </a:ext>
+            </a:extLst>
+          </p:cNvPr>
+          <p:cNvPicPr>
+            <a:picLocks noChangeAspect="1"/>
+          </p:cNvPicPr>
+          <p:nvPr/>
+        </p:nvPicPr>
+        <p:blipFill rotWithShape="1">
+          <a:blip r:embed="rId2">
+            <a:extLst>
+              <a:ext uri="{28A0092B-C50C-407E-A947-70E740481C1C}">
+                <a14:useLocalDpi xmlns:a14="http://schemas.microsoft.com/office/drawing/2010/main" val="0"/>
+              </a:ext>
+            </a:extLst>
+          </a:blip>
+          <a:srcRect r="51596"/>
+          <a:stretch/>
+        </p:blipFill>
+        <p:spPr>
+          <a:xfrm>
+            <a:off x="1475123" y="2900362"/>
+            <a:ext cx="4620877" cy="2481263"/>
+          </a:xfrm>
+          <a:prstGeom prst="rect">
+            <a:avLst/>
+          </a:prstGeom>
+        </p:spPr>
+      </p:pic>
     </p:spTree>
     <p:extLst>
       <p:ext uri="{BB962C8B-B14F-4D97-AF65-F5344CB8AC3E}">
@@ -5242,6 +5620,549 @@
   <p:clrMapOvr>
     <a:masterClrMapping/>
   </p:clrMapOvr>
+  <p:timing>
+    <p:tnLst>
+      <p:par>
+        <p:cTn id="1" dur="indefinite" restart="never" nodeType="tmRoot">
+          <p:childTnLst>
+            <p:seq concurrent="1" nextAc="seek">
+              <p:cTn id="2" dur="indefinite" nodeType="mainSeq">
+                <p:childTnLst>
+                  <p:par>
+                    <p:cTn id="3" fill="hold">
+                      <p:stCondLst>
+                        <p:cond delay="indefinite"/>
+                      </p:stCondLst>
+                      <p:childTnLst>
+                        <p:par>
+                          <p:cTn id="4" fill="hold">
+                            <p:stCondLst>
+                              <p:cond delay="0"/>
+                            </p:stCondLst>
+                            <p:childTnLst>
+                              <p:par>
+                                <p:cTn id="5" presetID="10" presetClass="entr" presetSubtype="0" fill="hold" nodeType="clickEffect">
+                                  <p:stCondLst>
+                                    <p:cond delay="0"/>
+                                  </p:stCondLst>
+                                  <p:childTnLst>
+                                    <p:set>
+                                      <p:cBhvr>
+                                        <p:cTn id="6" dur="1" fill="hold">
+                                          <p:stCondLst>
+                                            <p:cond delay="0"/>
+                                          </p:stCondLst>
+                                        </p:cTn>
+                                        <p:tgtEl>
+                                          <p:spTgt spid="5"/>
+                                        </p:tgtEl>
+                                        <p:attrNameLst>
+                                          <p:attrName>style.visibility</p:attrName>
+                                        </p:attrNameLst>
+                                      </p:cBhvr>
+                                      <p:to>
+                                        <p:strVal val="visible"/>
+                                      </p:to>
+                                    </p:set>
+                                    <p:animEffect transition="in" filter="fade">
+                                      <p:cBhvr>
+                                        <p:cTn id="7" dur="500"/>
+                                        <p:tgtEl>
+                                          <p:spTgt spid="5"/>
+                                        </p:tgtEl>
+                                      </p:cBhvr>
+                                    </p:animEffect>
+                                  </p:childTnLst>
+                                </p:cTn>
+                              </p:par>
+                            </p:childTnLst>
+                          </p:cTn>
+                        </p:par>
+                      </p:childTnLst>
+                    </p:cTn>
+                  </p:par>
+                  <p:par>
+                    <p:cTn id="8" fill="hold">
+                      <p:stCondLst>
+                        <p:cond delay="indefinite"/>
+                      </p:stCondLst>
+                      <p:childTnLst>
+                        <p:par>
+                          <p:cTn id="9" fill="hold">
+                            <p:stCondLst>
+                              <p:cond delay="0"/>
+                            </p:stCondLst>
+                            <p:childTnLst>
+                              <p:par>
+                                <p:cTn id="10" presetID="10" presetClass="entr" presetSubtype="0" fill="hold" nodeType="clickEffect">
+                                  <p:stCondLst>
+                                    <p:cond delay="0"/>
+                                  </p:stCondLst>
+                                  <p:childTnLst>
+                                    <p:set>
+                                      <p:cBhvr>
+                                        <p:cTn id="11" dur="1" fill="hold">
+                                          <p:stCondLst>
+                                            <p:cond delay="0"/>
+                                          </p:stCondLst>
+                                        </p:cTn>
+                                        <p:tgtEl>
+                                          <p:spTgt spid="3"/>
+                                        </p:tgtEl>
+                                        <p:attrNameLst>
+                                          <p:attrName>style.visibility</p:attrName>
+                                        </p:attrNameLst>
+                                      </p:cBhvr>
+                                      <p:to>
+                                        <p:strVal val="visible"/>
+                                      </p:to>
+                                    </p:set>
+                                    <p:animEffect transition="in" filter="fade">
+                                      <p:cBhvr>
+                                        <p:cTn id="12" dur="500"/>
+                                        <p:tgtEl>
+                                          <p:spTgt spid="3"/>
+                                        </p:tgtEl>
+                                      </p:cBhvr>
+                                    </p:animEffect>
+                                  </p:childTnLst>
+                                </p:cTn>
+                              </p:par>
+                            </p:childTnLst>
+                          </p:cTn>
+                        </p:par>
+                      </p:childTnLst>
+                    </p:cTn>
+                  </p:par>
+                  <p:par>
+                    <p:cTn id="13" fill="hold">
+                      <p:stCondLst>
+                        <p:cond delay="indefinite"/>
+                      </p:stCondLst>
+                      <p:childTnLst>
+                        <p:par>
+                          <p:cTn id="14" fill="hold">
+                            <p:stCondLst>
+                              <p:cond delay="0"/>
+                            </p:stCondLst>
+                            <p:childTnLst>
+                              <p:par>
+                                <p:cTn id="15" presetID="10" presetClass="exit" presetSubtype="0" fill="hold" nodeType="clickEffect">
+                                  <p:stCondLst>
+                                    <p:cond delay="0"/>
+                                  </p:stCondLst>
+                                  <p:childTnLst>
+                                    <p:animEffect transition="out" filter="fade">
+                                      <p:cBhvr>
+                                        <p:cTn id="16" dur="500"/>
+                                        <p:tgtEl>
+                                          <p:spTgt spid="3"/>
+                                        </p:tgtEl>
+                                      </p:cBhvr>
+                                    </p:animEffect>
+                                    <p:set>
+                                      <p:cBhvr>
+                                        <p:cTn id="17" dur="1" fill="hold">
+                                          <p:stCondLst>
+                                            <p:cond delay="499"/>
+                                          </p:stCondLst>
+                                        </p:cTn>
+                                        <p:tgtEl>
+                                          <p:spTgt spid="3"/>
+                                        </p:tgtEl>
+                                        <p:attrNameLst>
+                                          <p:attrName>style.visibility</p:attrName>
+                                        </p:attrNameLst>
+                                      </p:cBhvr>
+                                      <p:to>
+                                        <p:strVal val="hidden"/>
+                                      </p:to>
+                                    </p:set>
+                                  </p:childTnLst>
+                                </p:cTn>
+                              </p:par>
+                              <p:par>
+                                <p:cTn id="18" presetID="42" presetClass="path" presetSubtype="0" accel="50000" decel="50000" fill="hold" nodeType="withEffect">
+                                  <p:stCondLst>
+                                    <p:cond delay="0"/>
+                                  </p:stCondLst>
+                                  <p:childTnLst>
+                                    <p:animMotion origin="layout" path="M 3.33333E-6 -3.7037E-6 L 0.20651 -0.0037 " pathEditMode="relative" rAng="0" ptsTypes="AA">
+                                      <p:cBhvr>
+                                        <p:cTn id="19" dur="1000" fill="hold"/>
+                                        <p:tgtEl>
+                                          <p:spTgt spid="5"/>
+                                        </p:tgtEl>
+                                        <p:attrNameLst>
+                                          <p:attrName>ppt_x</p:attrName>
+                                          <p:attrName>ppt_y</p:attrName>
+                                        </p:attrNameLst>
+                                      </p:cBhvr>
+                                      <p:rCtr x="10326" y="-185"/>
+                                    </p:animMotion>
+                                  </p:childTnLst>
+                                </p:cTn>
+                              </p:par>
+                            </p:childTnLst>
+                          </p:cTn>
+                        </p:par>
+                      </p:childTnLst>
+                    </p:cTn>
+                  </p:par>
+                </p:childTnLst>
+              </p:cTn>
+              <p:prevCondLst>
+                <p:cond evt="onPrev" delay="0">
+                  <p:tgtEl>
+                    <p:sldTgt/>
+                  </p:tgtEl>
+                </p:cond>
+              </p:prevCondLst>
+              <p:nextCondLst>
+                <p:cond evt="onNext" delay="0">
+                  <p:tgtEl>
+                    <p:sldTgt/>
+                  </p:tgtEl>
+                </p:cond>
+              </p:nextCondLst>
+            </p:seq>
+          </p:childTnLst>
+        </p:cTn>
+      </p:par>
+    </p:tnLst>
+  </p:timing>
+</p:sld>
+</file>
+
+<file path=ppt/slides/slide8.xml><?xml version="1.0" encoding="utf-8"?>
+<p:sld xmlns:a="http://schemas.openxmlformats.org/drawingml/2006/main" xmlns:r="http://schemas.openxmlformats.org/officeDocument/2006/relationships" xmlns:p="http://schemas.openxmlformats.org/presentationml/2006/main">
+  <p:cSld>
+    <p:spTree>
+      <p:nvGrpSpPr>
+        <p:cNvPr id="1" name=""/>
+        <p:cNvGrpSpPr/>
+        <p:nvPr/>
+      </p:nvGrpSpPr>
+      <p:grpSpPr>
+        <a:xfrm>
+          <a:off x="0" y="0"/>
+          <a:ext cx="0" cy="0"/>
+          <a:chOff x="0" y="0"/>
+          <a:chExt cx="0" cy="0"/>
+        </a:xfrm>
+      </p:grpSpPr>
+      <p:sp>
+        <p:nvSpPr>
+          <p:cNvPr id="2" name="Title 1">
+            <a:extLst>
+              <a:ext uri="{FF2B5EF4-FFF2-40B4-BE49-F238E27FC236}">
+                <a16:creationId xmlns:a16="http://schemas.microsoft.com/office/drawing/2014/main" id="{5F4B31D6-F7E1-4E49-90FA-41A126FEFE2A}"/>
+              </a:ext>
+            </a:extLst>
+          </p:cNvPr>
+          <p:cNvSpPr>
+            <a:spLocks noGrp="1"/>
+          </p:cNvSpPr>
+          <p:nvPr>
+            <p:ph type="title"/>
+          </p:nvPr>
+        </p:nvSpPr>
+        <p:spPr/>
+        <p:txBody>
+          <a:bodyPr/>
+          <a:lstStyle/>
+          <a:p>
+            <a:endParaRPr lang="en-NL"/>
+          </a:p>
+        </p:txBody>
+      </p:sp>
+      <p:sp>
+        <p:nvSpPr>
+          <p:cNvPr id="3" name="Content Placeholder 2">
+            <a:extLst>
+              <a:ext uri="{FF2B5EF4-FFF2-40B4-BE49-F238E27FC236}">
+                <a16:creationId xmlns:a16="http://schemas.microsoft.com/office/drawing/2014/main" id="{D744EE2B-39F3-45BD-A6A1-D29B0C50708C}"/>
+              </a:ext>
+            </a:extLst>
+          </p:cNvPr>
+          <p:cNvSpPr>
+            <a:spLocks noGrp="1"/>
+          </p:cNvSpPr>
+          <p:nvPr>
+            <p:ph idx="1"/>
+          </p:nvPr>
+        </p:nvSpPr>
+        <p:spPr/>
+        <p:txBody>
+          <a:bodyPr/>
+          <a:lstStyle/>
+          <a:p>
+            <a:endParaRPr lang="en-NL" dirty="0"/>
+          </a:p>
+        </p:txBody>
+      </p:sp>
+      <p:pic>
+        <p:nvPicPr>
+          <p:cNvPr id="5" name="Picture 4">
+            <a:extLst>
+              <a:ext uri="{FF2B5EF4-FFF2-40B4-BE49-F238E27FC236}">
+                <a16:creationId xmlns:a16="http://schemas.microsoft.com/office/drawing/2014/main" id="{52CD8E09-823D-44A7-8567-3C175EF7D420}"/>
+              </a:ext>
+            </a:extLst>
+          </p:cNvPr>
+          <p:cNvPicPr>
+            <a:picLocks noChangeAspect="1"/>
+          </p:cNvPicPr>
+          <p:nvPr/>
+        </p:nvPicPr>
+        <p:blipFill>
+          <a:blip r:embed="rId2"/>
+          <a:stretch>
+            <a:fillRect/>
+          </a:stretch>
+        </p:blipFill>
+        <p:spPr>
+          <a:xfrm>
+            <a:off x="197126" y="1690688"/>
+            <a:ext cx="11797748" cy="3677108"/>
+          </a:xfrm>
+          <a:prstGeom prst="rect">
+            <a:avLst/>
+          </a:prstGeom>
+        </p:spPr>
+      </p:pic>
+    </p:spTree>
+    <p:extLst>
+      <p:ext uri="{BB962C8B-B14F-4D97-AF65-F5344CB8AC3E}">
+        <p14:creationId xmlns:p14="http://schemas.microsoft.com/office/powerpoint/2010/main" val="615494315"/>
+      </p:ext>
+    </p:extLst>
+  </p:cSld>
+  <p:clrMapOvr>
+    <a:masterClrMapping/>
+  </p:clrMapOvr>
+</p:sld>
+</file>
+
+<file path=ppt/slides/slide9.xml><?xml version="1.0" encoding="utf-8"?>
+<p:sld xmlns:a="http://schemas.openxmlformats.org/drawingml/2006/main" xmlns:r="http://schemas.openxmlformats.org/officeDocument/2006/relationships" xmlns:p="http://schemas.openxmlformats.org/presentationml/2006/main">
+  <p:cSld>
+    <p:spTree>
+      <p:nvGrpSpPr>
+        <p:cNvPr id="1" name=""/>
+        <p:cNvGrpSpPr/>
+        <p:nvPr/>
+      </p:nvGrpSpPr>
+      <p:grpSpPr>
+        <a:xfrm>
+          <a:off x="0" y="0"/>
+          <a:ext cx="0" cy="0"/>
+          <a:chOff x="0" y="0"/>
+          <a:chExt cx="0" cy="0"/>
+        </a:xfrm>
+      </p:grpSpPr>
+      <p:pic>
+        <p:nvPicPr>
+          <p:cNvPr id="9" name="Picture 8">
+            <a:extLst>
+              <a:ext uri="{FF2B5EF4-FFF2-40B4-BE49-F238E27FC236}">
+                <a16:creationId xmlns:a16="http://schemas.microsoft.com/office/drawing/2014/main" id="{90A32410-0AEB-4108-95AF-09B66B73C7D8}"/>
+              </a:ext>
+            </a:extLst>
+          </p:cNvPr>
+          <p:cNvPicPr>
+            <a:picLocks noChangeAspect="1"/>
+          </p:cNvPicPr>
+          <p:nvPr/>
+        </p:nvPicPr>
+        <p:blipFill rotWithShape="1">
+          <a:blip r:embed="rId2"/>
+          <a:srcRect r="750"/>
+          <a:stretch/>
+        </p:blipFill>
+        <p:spPr>
+          <a:xfrm>
+            <a:off x="0" y="673193"/>
+            <a:ext cx="12192000" cy="6184807"/>
+          </a:xfrm>
+          <a:prstGeom prst="rect">
+            <a:avLst/>
+          </a:prstGeom>
+        </p:spPr>
+      </p:pic>
+      <p:pic>
+        <p:nvPicPr>
+          <p:cNvPr id="7" name="Picture 6">
+            <a:extLst>
+              <a:ext uri="{FF2B5EF4-FFF2-40B4-BE49-F238E27FC236}">
+                <a16:creationId xmlns:a16="http://schemas.microsoft.com/office/drawing/2014/main" id="{094F7D90-A82E-4F6C-A7F1-1723D687A2C5}"/>
+              </a:ext>
+            </a:extLst>
+          </p:cNvPr>
+          <p:cNvPicPr>
+            <a:picLocks noChangeAspect="1"/>
+          </p:cNvPicPr>
+          <p:nvPr/>
+        </p:nvPicPr>
+        <p:blipFill rotWithShape="1">
+          <a:blip r:embed="rId2"/>
+          <a:srcRect l="83200" t="7880" r="751" b="8874"/>
+          <a:stretch/>
+        </p:blipFill>
+        <p:spPr>
+          <a:xfrm>
+            <a:off x="10220446" y="1160556"/>
+            <a:ext cx="1971554" cy="5148580"/>
+          </a:xfrm>
+          <a:prstGeom prst="rect">
+            <a:avLst/>
+          </a:prstGeom>
+        </p:spPr>
+      </p:pic>
+      <p:pic>
+        <p:nvPicPr>
+          <p:cNvPr id="8" name="Picture 7">
+            <a:extLst>
+              <a:ext uri="{FF2B5EF4-FFF2-40B4-BE49-F238E27FC236}">
+                <a16:creationId xmlns:a16="http://schemas.microsoft.com/office/drawing/2014/main" id="{05A3B545-E210-43B2-B3E7-D1962FCB22D4}"/>
+              </a:ext>
+            </a:extLst>
+          </p:cNvPr>
+          <p:cNvPicPr>
+            <a:picLocks noChangeAspect="1"/>
+          </p:cNvPicPr>
+          <p:nvPr/>
+        </p:nvPicPr>
+        <p:blipFill rotWithShape="1">
+          <a:blip r:embed="rId3"/>
+          <a:srcRect l="6727" t="38970" r="86621" b="31880"/>
+          <a:stretch/>
+        </p:blipFill>
+        <p:spPr>
+          <a:xfrm>
+            <a:off x="5735320" y="96520"/>
+            <a:ext cx="784860" cy="1071880"/>
+          </a:xfrm>
+          <a:prstGeom prst="rect">
+            <a:avLst/>
+          </a:prstGeom>
+        </p:spPr>
+      </p:pic>
+    </p:spTree>
+    <p:extLst>
+      <p:ext uri="{BB962C8B-B14F-4D97-AF65-F5344CB8AC3E}">
+        <p14:creationId xmlns:p14="http://schemas.microsoft.com/office/powerpoint/2010/main" val="540363736"/>
+      </p:ext>
+    </p:extLst>
+  </p:cSld>
+  <p:clrMapOvr>
+    <a:masterClrMapping/>
+  </p:clrMapOvr>
+  <p:timing>
+    <p:tnLst>
+      <p:par>
+        <p:cTn id="1" dur="indefinite" restart="never" nodeType="tmRoot">
+          <p:childTnLst>
+            <p:seq concurrent="1" nextAc="seek">
+              <p:cTn id="2" dur="indefinite" nodeType="mainSeq">
+                <p:childTnLst>
+                  <p:par>
+                    <p:cTn id="3" fill="hold">
+                      <p:stCondLst>
+                        <p:cond delay="indefinite"/>
+                      </p:stCondLst>
+                      <p:childTnLst>
+                        <p:par>
+                          <p:cTn id="4" fill="hold">
+                            <p:stCondLst>
+                              <p:cond delay="0"/>
+                            </p:stCondLst>
+                            <p:childTnLst>
+                              <p:par>
+                                <p:cTn id="5" presetID="42" presetClass="path" presetSubtype="0" accel="50000" decel="50000" fill="hold" nodeType="clickEffect">
+                                  <p:stCondLst>
+                                    <p:cond delay="0"/>
+                                  </p:stCondLst>
+                                  <p:childTnLst>
+                                    <p:animMotion origin="layout" path="M -6.25E-7 -4.44444E-6 L -0.4069 -4.44444E-6 " pathEditMode="relative" rAng="0" ptsTypes="AA">
+                                      <p:cBhvr>
+                                        <p:cTn id="6" dur="1000" fill="hold"/>
+                                        <p:tgtEl>
+                                          <p:spTgt spid="7"/>
+                                        </p:tgtEl>
+                                        <p:attrNameLst>
+                                          <p:attrName>ppt_x</p:attrName>
+                                          <p:attrName>ppt_y</p:attrName>
+                                        </p:attrNameLst>
+                                      </p:cBhvr>
+                                      <p:rCtr x="-20352" y="0"/>
+                                    </p:animMotion>
+                                  </p:childTnLst>
+                                </p:cTn>
+                              </p:par>
+                              <p:par>
+                                <p:cTn id="7" presetID="10" presetClass="exit" presetSubtype="0" fill="hold" nodeType="withEffect">
+                                  <p:stCondLst>
+                                    <p:cond delay="0"/>
+                                  </p:stCondLst>
+                                  <p:childTnLst>
+                                    <p:animEffect transition="out" filter="fade">
+                                      <p:cBhvr>
+                                        <p:cTn id="8" dur="500"/>
+                                        <p:tgtEl>
+                                          <p:spTgt spid="9"/>
+                                        </p:tgtEl>
+                                      </p:cBhvr>
+                                    </p:animEffect>
+                                    <p:set>
+                                      <p:cBhvr>
+                                        <p:cTn id="9" dur="1" fill="hold">
+                                          <p:stCondLst>
+                                            <p:cond delay="499"/>
+                                          </p:stCondLst>
+                                        </p:cTn>
+                                        <p:tgtEl>
+                                          <p:spTgt spid="9"/>
+                                        </p:tgtEl>
+                                        <p:attrNameLst>
+                                          <p:attrName>style.visibility</p:attrName>
+                                        </p:attrNameLst>
+                                      </p:cBhvr>
+                                      <p:to>
+                                        <p:strVal val="hidden"/>
+                                      </p:to>
+                                    </p:set>
+                                  </p:childTnLst>
+                                </p:cTn>
+                              </p:par>
+                            </p:childTnLst>
+                          </p:cTn>
+                        </p:par>
+                      </p:childTnLst>
+                    </p:cTn>
+                  </p:par>
+                </p:childTnLst>
+              </p:cTn>
+              <p:prevCondLst>
+                <p:cond evt="onPrev" delay="0">
+                  <p:tgtEl>
+                    <p:sldTgt/>
+                  </p:tgtEl>
+                </p:cond>
+              </p:prevCondLst>
+              <p:nextCondLst>
+                <p:cond evt="onNext" delay="0">
+                  <p:tgtEl>
+                    <p:sldTgt/>
+                  </p:tgtEl>
+                </p:cond>
+              </p:nextCondLst>
+            </p:seq>
+          </p:childTnLst>
+        </p:cTn>
+      </p:par>
+    </p:tnLst>
+  </p:timing>
 </p:sld>
 </file>
 

</xml_diff>

<commit_message>
In principe final, mss nog een extra afbeelding bij codevoorbelden. Procesvariabelen ofzo
</commit_message>
<xml_diff>
--- a/Presentatie/Camunda_Brooks_JDI.pptx
+++ b/Presentatie/Camunda_Brooks_JDI.pptx
@@ -19,13 +19,13 @@
     <p:sldId id="268" r:id="rId13"/>
     <p:sldId id="269" r:id="rId14"/>
     <p:sldId id="270" r:id="rId15"/>
-    <p:sldId id="274" r:id="rId16"/>
-    <p:sldId id="276" r:id="rId17"/>
-    <p:sldId id="277" r:id="rId18"/>
+    <p:sldId id="276" r:id="rId16"/>
+    <p:sldId id="277" r:id="rId17"/>
+    <p:sldId id="278" r:id="rId18"/>
     <p:sldId id="275" r:id="rId19"/>
-    <p:sldId id="278" r:id="rId20"/>
-    <p:sldId id="272" r:id="rId21"/>
-    <p:sldId id="273" r:id="rId22"/>
+    <p:sldId id="272" r:id="rId20"/>
+    <p:sldId id="273" r:id="rId21"/>
+    <p:sldId id="280" r:id="rId22"/>
   </p:sldIdLst>
   <p:sldSz cx="12192000" cy="6858000"/>
   <p:notesSz cx="6858000" cy="9144000"/>
@@ -281,7 +281,7 @@
           <a:p>
             <a:fld id="{6CA48DFA-0712-4034-9BD2-F4238B581074}" type="datetimeFigureOut">
               <a:rPr lang="en-NL" smtClean="0"/>
-              <a:t>16/02/2022</a:t>
+              <a:t>17/02/2022</a:t>
             </a:fld>
             <a:endParaRPr lang="en-NL"/>
           </a:p>
@@ -335,7 +335,7 @@
           <a:p>
             <a:fld id="{5B2D577F-BB6D-4BA2-97DF-45FF70AD728E}" type="slidenum">
               <a:rPr lang="en-NL" smtClean="0"/>
-              <a:t>‹nr.›</a:t>
+              <a:t>‹#›</a:t>
             </a:fld>
             <a:endParaRPr lang="en-NL"/>
           </a:p>
@@ -481,7 +481,7 @@
           <a:p>
             <a:fld id="{6CA48DFA-0712-4034-9BD2-F4238B581074}" type="datetimeFigureOut">
               <a:rPr lang="en-NL" smtClean="0"/>
-              <a:t>16/02/2022</a:t>
+              <a:t>17/02/2022</a:t>
             </a:fld>
             <a:endParaRPr lang="en-NL"/>
           </a:p>
@@ -535,7 +535,7 @@
           <a:p>
             <a:fld id="{5B2D577F-BB6D-4BA2-97DF-45FF70AD728E}" type="slidenum">
               <a:rPr lang="en-NL" smtClean="0"/>
-              <a:t>‹nr.›</a:t>
+              <a:t>‹#›</a:t>
             </a:fld>
             <a:endParaRPr lang="en-NL"/>
           </a:p>
@@ -691,7 +691,7 @@
           <a:p>
             <a:fld id="{6CA48DFA-0712-4034-9BD2-F4238B581074}" type="datetimeFigureOut">
               <a:rPr lang="en-NL" smtClean="0"/>
-              <a:t>16/02/2022</a:t>
+              <a:t>17/02/2022</a:t>
             </a:fld>
             <a:endParaRPr lang="en-NL"/>
           </a:p>
@@ -745,7 +745,7 @@
           <a:p>
             <a:fld id="{5B2D577F-BB6D-4BA2-97DF-45FF70AD728E}" type="slidenum">
               <a:rPr lang="en-NL" smtClean="0"/>
-              <a:t>‹nr.›</a:t>
+              <a:t>‹#›</a:t>
             </a:fld>
             <a:endParaRPr lang="en-NL"/>
           </a:p>
@@ -891,7 +891,7 @@
           <a:p>
             <a:fld id="{6CA48DFA-0712-4034-9BD2-F4238B581074}" type="datetimeFigureOut">
               <a:rPr lang="en-NL" smtClean="0"/>
-              <a:t>16/02/2022</a:t>
+              <a:t>17/02/2022</a:t>
             </a:fld>
             <a:endParaRPr lang="en-NL"/>
           </a:p>
@@ -945,7 +945,7 @@
           <a:p>
             <a:fld id="{5B2D577F-BB6D-4BA2-97DF-45FF70AD728E}" type="slidenum">
               <a:rPr lang="en-NL" smtClean="0"/>
-              <a:t>‹nr.›</a:t>
+              <a:t>‹#›</a:t>
             </a:fld>
             <a:endParaRPr lang="en-NL"/>
           </a:p>
@@ -1167,7 +1167,7 @@
           <a:p>
             <a:fld id="{6CA48DFA-0712-4034-9BD2-F4238B581074}" type="datetimeFigureOut">
               <a:rPr lang="en-NL" smtClean="0"/>
-              <a:t>16/02/2022</a:t>
+              <a:t>17/02/2022</a:t>
             </a:fld>
             <a:endParaRPr lang="en-NL"/>
           </a:p>
@@ -1221,7 +1221,7 @@
           <a:p>
             <a:fld id="{5B2D577F-BB6D-4BA2-97DF-45FF70AD728E}" type="slidenum">
               <a:rPr lang="en-NL" smtClean="0"/>
-              <a:t>‹nr.›</a:t>
+              <a:t>‹#›</a:t>
             </a:fld>
             <a:endParaRPr lang="en-NL"/>
           </a:p>
@@ -1435,7 +1435,7 @@
           <a:p>
             <a:fld id="{6CA48DFA-0712-4034-9BD2-F4238B581074}" type="datetimeFigureOut">
               <a:rPr lang="en-NL" smtClean="0"/>
-              <a:t>16/02/2022</a:t>
+              <a:t>17/02/2022</a:t>
             </a:fld>
             <a:endParaRPr lang="en-NL"/>
           </a:p>
@@ -1489,7 +1489,7 @@
           <a:p>
             <a:fld id="{5B2D577F-BB6D-4BA2-97DF-45FF70AD728E}" type="slidenum">
               <a:rPr lang="en-NL" smtClean="0"/>
-              <a:t>‹nr.›</a:t>
+              <a:t>‹#›</a:t>
             </a:fld>
             <a:endParaRPr lang="en-NL"/>
           </a:p>
@@ -1850,7 +1850,7 @@
           <a:p>
             <a:fld id="{6CA48DFA-0712-4034-9BD2-F4238B581074}" type="datetimeFigureOut">
               <a:rPr lang="en-NL" smtClean="0"/>
-              <a:t>16/02/2022</a:t>
+              <a:t>17/02/2022</a:t>
             </a:fld>
             <a:endParaRPr lang="en-NL"/>
           </a:p>
@@ -1904,7 +1904,7 @@
           <a:p>
             <a:fld id="{5B2D577F-BB6D-4BA2-97DF-45FF70AD728E}" type="slidenum">
               <a:rPr lang="en-NL" smtClean="0"/>
-              <a:t>‹nr.›</a:t>
+              <a:t>‹#›</a:t>
             </a:fld>
             <a:endParaRPr lang="en-NL"/>
           </a:p>
@@ -1992,7 +1992,7 @@
           <a:p>
             <a:fld id="{6CA48DFA-0712-4034-9BD2-F4238B581074}" type="datetimeFigureOut">
               <a:rPr lang="en-NL" smtClean="0"/>
-              <a:t>16/02/2022</a:t>
+              <a:t>17/02/2022</a:t>
             </a:fld>
             <a:endParaRPr lang="en-NL"/>
           </a:p>
@@ -2046,7 +2046,7 @@
           <a:p>
             <a:fld id="{5B2D577F-BB6D-4BA2-97DF-45FF70AD728E}" type="slidenum">
               <a:rPr lang="en-NL" smtClean="0"/>
-              <a:t>‹nr.›</a:t>
+              <a:t>‹#›</a:t>
             </a:fld>
             <a:endParaRPr lang="en-NL"/>
           </a:p>
@@ -2105,7 +2105,7 @@
           <a:p>
             <a:fld id="{6CA48DFA-0712-4034-9BD2-F4238B581074}" type="datetimeFigureOut">
               <a:rPr lang="en-NL" smtClean="0"/>
-              <a:t>16/02/2022</a:t>
+              <a:t>17/02/2022</a:t>
             </a:fld>
             <a:endParaRPr lang="en-NL"/>
           </a:p>
@@ -2159,7 +2159,7 @@
           <a:p>
             <a:fld id="{5B2D577F-BB6D-4BA2-97DF-45FF70AD728E}" type="slidenum">
               <a:rPr lang="en-NL" smtClean="0"/>
-              <a:t>‹nr.›</a:t>
+              <a:t>‹#›</a:t>
             </a:fld>
             <a:endParaRPr lang="en-NL"/>
           </a:p>
@@ -2418,7 +2418,7 @@
           <a:p>
             <a:fld id="{6CA48DFA-0712-4034-9BD2-F4238B581074}" type="datetimeFigureOut">
               <a:rPr lang="en-NL" smtClean="0"/>
-              <a:t>16/02/2022</a:t>
+              <a:t>17/02/2022</a:t>
             </a:fld>
             <a:endParaRPr lang="en-NL"/>
           </a:p>
@@ -2472,7 +2472,7 @@
           <a:p>
             <a:fld id="{5B2D577F-BB6D-4BA2-97DF-45FF70AD728E}" type="slidenum">
               <a:rPr lang="en-NL" smtClean="0"/>
-              <a:t>‹nr.›</a:t>
+              <a:t>‹#›</a:t>
             </a:fld>
             <a:endParaRPr lang="en-NL"/>
           </a:p>
@@ -2707,7 +2707,7 @@
           <a:p>
             <a:fld id="{6CA48DFA-0712-4034-9BD2-F4238B581074}" type="datetimeFigureOut">
               <a:rPr lang="en-NL" smtClean="0"/>
-              <a:t>16/02/2022</a:t>
+              <a:t>17/02/2022</a:t>
             </a:fld>
             <a:endParaRPr lang="en-NL"/>
           </a:p>
@@ -2761,7 +2761,7 @@
           <a:p>
             <a:fld id="{5B2D577F-BB6D-4BA2-97DF-45FF70AD728E}" type="slidenum">
               <a:rPr lang="en-NL" smtClean="0"/>
-              <a:t>‹nr.›</a:t>
+              <a:t>‹#›</a:t>
             </a:fld>
             <a:endParaRPr lang="en-NL"/>
           </a:p>
@@ -2950,7 +2950,7 @@
           <a:p>
             <a:fld id="{6CA48DFA-0712-4034-9BD2-F4238B581074}" type="datetimeFigureOut">
               <a:rPr lang="en-NL" smtClean="0"/>
-              <a:t>16/02/2022</a:t>
+              <a:t>17/02/2022</a:t>
             </a:fld>
             <a:endParaRPr lang="en-NL"/>
           </a:p>
@@ -3040,7 +3040,7 @@
           <a:p>
             <a:fld id="{5B2D577F-BB6D-4BA2-97DF-45FF70AD728E}" type="slidenum">
               <a:rPr lang="en-NL" smtClean="0"/>
-              <a:t>‹nr.›</a:t>
+              <a:t>‹#›</a:t>
             </a:fld>
             <a:endParaRPr lang="en-NL"/>
           </a:p>
@@ -3705,50 +3705,42 @@
           </a:prstGeom>
         </p:spPr>
       </p:pic>
-      <p:sp>
-        <p:nvSpPr>
-          <p:cNvPr id="2" name="Tekstvak 1">
-            <a:extLst>
-              <a:ext uri="{FF2B5EF4-FFF2-40B4-BE49-F238E27FC236}">
-                <a16:creationId xmlns:a16="http://schemas.microsoft.com/office/drawing/2014/main" id="{F1CF5D57-9BA0-4A9F-87D4-50EE6EC4921E}"/>
-              </a:ext>
-            </a:extLst>
-          </p:cNvPr>
-          <p:cNvSpPr txBox="1"/>
+      <p:pic>
+        <p:nvPicPr>
+          <p:cNvPr id="5" name="Picture 4">
+            <a:extLst>
+              <a:ext uri="{FF2B5EF4-FFF2-40B4-BE49-F238E27FC236}">
+                <a16:creationId xmlns:a16="http://schemas.microsoft.com/office/drawing/2014/main" id="{BC36A3F0-AEB4-4E7D-B6A9-68E4AA6DEAD8}"/>
+              </a:ext>
+            </a:extLst>
+          </p:cNvPr>
+          <p:cNvPicPr>
+            <a:picLocks noChangeAspect="1"/>
+          </p:cNvPicPr>
           <p:nvPr/>
-        </p:nvSpPr>
+        </p:nvPicPr>
+        <p:blipFill>
+          <a:blip r:embed="rId3">
+            <a:extLst>
+              <a:ext uri="{28A0092B-C50C-407E-A947-70E740481C1C}">
+                <a14:useLocalDpi xmlns:a14="http://schemas.microsoft.com/office/drawing/2010/main" val="0"/>
+              </a:ext>
+            </a:extLst>
+          </a:blip>
+          <a:stretch>
+            <a:fillRect/>
+          </a:stretch>
+        </p:blipFill>
         <p:spPr>
           <a:xfrm>
-            <a:off x="6491235" y="2532185"/>
-            <a:ext cx="2421653" cy="646331"/>
+            <a:off x="0" y="866721"/>
+            <a:ext cx="12192000" cy="5991279"/>
           </a:xfrm>
           <a:prstGeom prst="rect">
             <a:avLst/>
           </a:prstGeom>
-          <a:noFill/>
         </p:spPr>
-        <p:txBody>
-          <a:bodyPr wrap="square" rtlCol="0">
-            <a:spAutoFit/>
-          </a:bodyPr>
-          <a:lstStyle/>
-          <a:p>
-            <a:r>
-              <a:rPr lang="en-GB" dirty="0"/>
-              <a:t>TODO nieuwe </a:t>
-            </a:r>
-            <a:r>
-              <a:rPr lang="en-GB" dirty="0" err="1"/>
-              <a:t>tasklist</a:t>
-            </a:r>
-            <a:r>
-              <a:rPr lang="en-GB" dirty="0"/>
-              <a:t> met task</a:t>
-            </a:r>
-            <a:endParaRPr lang="nl-NL" dirty="0"/>
-          </a:p>
-        </p:txBody>
-      </p:sp>
+      </p:pic>
     </p:spTree>
     <p:extLst>
       <p:ext uri="{BB962C8B-B14F-4D97-AF65-F5344CB8AC3E}">
@@ -3884,7 +3876,7 @@
           <p:nvPr>
             <p:extLst>
               <p:ext uri="{D42A27DB-BD31-4B8C-83A1-F6EECF244321}">
-                <p14:modId xmlns:p14="http://schemas.microsoft.com/office/powerpoint/2010/main" val="1196348144"/>
+                <p14:modId xmlns:p14="http://schemas.microsoft.com/office/powerpoint/2010/main" val="1190596352"/>
               </p:ext>
             </p:extLst>
           </p:nvPr>
@@ -3923,7 +3915,7 @@
                     <a:p>
                       <a:r>
                         <a:rPr lang="en-GB" b="0" dirty="0"/>
-                        <a:t>name</a:t>
+                        <a:t>‘name’</a:t>
                       </a:r>
                       <a:endParaRPr lang="nl-NL" b="0" dirty="0"/>
                     </a:p>
@@ -3937,7 +3929,7 @@
                     <a:p>
                       <a:r>
                         <a:rPr lang="en-GB" b="0" dirty="0"/>
-                        <a:t>Sem</a:t>
+                        <a:t>‘Sem’</a:t>
                       </a:r>
                       <a:endParaRPr lang="nl-NL" b="0" dirty="0"/>
                     </a:p>
@@ -3974,10 +3966,17 @@
                         <a:defRPr/>
                       </a:pPr>
                       <a:r>
+                        <a:rPr lang="en-GB" dirty="0"/>
+                        <a:t>‘</a:t>
+                      </a:r>
+                      <a:r>
                         <a:rPr lang="en-GB" dirty="0" err="1"/>
                         <a:t>driver_license_age</a:t>
                       </a:r>
-                      <a:endParaRPr lang="en-GB" dirty="0"/>
+                      <a:r>
+                        <a:rPr lang="en-GB" dirty="0"/>
+                        <a:t>’</a:t>
+                      </a:r>
                     </a:p>
                   </a:txBody>
                   <a:tcPr/>
@@ -4027,7 +4026,7 @@
                       </a:pPr>
                       <a:r>
                         <a:rPr lang="en-GB" dirty="0"/>
-                        <a:t>age</a:t>
+                        <a:t>‘age’</a:t>
                       </a:r>
                       <a:endParaRPr lang="nl-NL" dirty="0"/>
                     </a:p>
@@ -4061,8 +4060,16 @@
                     <a:lstStyle/>
                     <a:p>
                       <a:r>
+                        <a:rPr lang="en-GB" dirty="0"/>
+                        <a:t>‘</a:t>
+                      </a:r>
+                      <a:r>
                         <a:rPr lang="en-GB" dirty="0" err="1"/>
                         <a:t>is_verified</a:t>
+                      </a:r>
+                      <a:r>
+                        <a:rPr lang="en-GB" dirty="0"/>
+                        <a:t>’</a:t>
                       </a:r>
                       <a:endParaRPr lang="nl-NL" dirty="0"/>
                     </a:p>
@@ -4076,7 +4083,7 @@
                     <a:p>
                       <a:r>
                         <a:rPr lang="en-GB" dirty="0"/>
-                        <a:t>false</a:t>
+                        <a:t>true</a:t>
                       </a:r>
                       <a:endParaRPr lang="nl-NL" dirty="0"/>
                     </a:p>
@@ -4086,6 +4093,286 @@
                 <a:extLst>
                   <a:ext uri="{0D108BD9-81ED-4DB2-BD59-A6C34878D82A}">
                     <a16:rowId xmlns:a16="http://schemas.microsoft.com/office/drawing/2014/main" val="693893805"/>
+                  </a:ext>
+                </a:extLst>
+              </a:tr>
+            </a:tbl>
+          </a:graphicData>
+        </a:graphic>
+      </p:graphicFrame>
+      <p:graphicFrame>
+        <p:nvGraphicFramePr>
+          <p:cNvPr id="9" name="Tabel 8">
+            <a:extLst>
+              <a:ext uri="{FF2B5EF4-FFF2-40B4-BE49-F238E27FC236}">
+                <a16:creationId xmlns:a16="http://schemas.microsoft.com/office/drawing/2014/main" id="{85546AC6-AA6F-4A50-B79F-443EE6610CD7}"/>
+              </a:ext>
+            </a:extLst>
+          </p:cNvPr>
+          <p:cNvGraphicFramePr>
+            <a:graphicFrameLocks noGrp="1"/>
+          </p:cNvGraphicFramePr>
+          <p:nvPr>
+            <p:extLst>
+              <p:ext uri="{D42A27DB-BD31-4B8C-83A1-F6EECF244321}">
+                <p14:modId xmlns:p14="http://schemas.microsoft.com/office/powerpoint/2010/main" val="3698827295"/>
+              </p:ext>
+            </p:extLst>
+          </p:nvPr>
+        </p:nvGraphicFramePr>
+        <p:xfrm>
+          <a:off x="1002995" y="3620380"/>
+          <a:ext cx="4704724" cy="1854200"/>
+        </p:xfrm>
+        <a:graphic>
+          <a:graphicData uri="http://schemas.openxmlformats.org/drawingml/2006/table">
+            <a:tbl>
+              <a:tblPr firstRow="1" bandRow="1">
+                <a:tableStyleId>{8A107856-5554-42FB-B03E-39F5DBC370BA}</a:tableStyleId>
+              </a:tblPr>
+              <a:tblGrid>
+                <a:gridCol w="2352362">
+                  <a:extLst>
+                    <a:ext uri="{9D8B030D-6E8A-4147-A177-3AD203B41FA5}">
+                      <a16:colId xmlns:a16="http://schemas.microsoft.com/office/drawing/2014/main" val="4232692361"/>
+                    </a:ext>
+                  </a:extLst>
+                </a:gridCol>
+                <a:gridCol w="2352362">
+                  <a:extLst>
+                    <a:ext uri="{9D8B030D-6E8A-4147-A177-3AD203B41FA5}">
+                      <a16:colId xmlns:a16="http://schemas.microsoft.com/office/drawing/2014/main" val="4061827893"/>
+                    </a:ext>
+                  </a:extLst>
+                </a:gridCol>
+              </a:tblGrid>
+              <a:tr h="370840">
+                <a:tc>
+                  <a:txBody>
+                    <a:bodyPr/>
+                    <a:lstStyle/>
+                    <a:p>
+                      <a:r>
+                        <a:rPr lang="en-GB" b="0" dirty="0"/>
+                        <a:t>‘name’</a:t>
+                      </a:r>
+                      <a:endParaRPr lang="nl-NL" b="0" dirty="0"/>
+                    </a:p>
+                  </a:txBody>
+                  <a:tcPr/>
+                </a:tc>
+                <a:tc>
+                  <a:txBody>
+                    <a:bodyPr/>
+                    <a:lstStyle/>
+                    <a:p>
+                      <a:r>
+                        <a:rPr lang="en-GB" b="0" dirty="0"/>
+                        <a:t>‘Sem’</a:t>
+                      </a:r>
+                      <a:endParaRPr lang="nl-NL" b="0" dirty="0"/>
+                    </a:p>
+                  </a:txBody>
+                  <a:tcPr/>
+                </a:tc>
+                <a:extLst>
+                  <a:ext uri="{0D108BD9-81ED-4DB2-BD59-A6C34878D82A}">
+                    <a16:rowId xmlns:a16="http://schemas.microsoft.com/office/drawing/2014/main" val="2167108131"/>
+                  </a:ext>
+                </a:extLst>
+              </a:tr>
+              <a:tr h="370840">
+                <a:tc>
+                  <a:txBody>
+                    <a:bodyPr/>
+                    <a:lstStyle/>
+                    <a:p>
+                      <a:pPr marL="0" marR="0" lvl="0" indent="0" algn="l" defTabSz="914400" rtl="0" eaLnBrk="1" fontAlgn="auto" latinLnBrk="0" hangingPunct="1">
+                        <a:lnSpc>
+                          <a:spcPct val="100000"/>
+                        </a:lnSpc>
+                        <a:spcBef>
+                          <a:spcPts val="0"/>
+                        </a:spcBef>
+                        <a:spcAft>
+                          <a:spcPts val="0"/>
+                        </a:spcAft>
+                        <a:buClrTx/>
+                        <a:buSzTx/>
+                        <a:buFontTx/>
+                        <a:buNone/>
+                        <a:tabLst/>
+                        <a:defRPr/>
+                      </a:pPr>
+                      <a:r>
+                        <a:rPr lang="en-GB" dirty="0"/>
+                        <a:t>‘</a:t>
+                      </a:r>
+                      <a:r>
+                        <a:rPr lang="en-GB" dirty="0" err="1"/>
+                        <a:t>driver_license_age</a:t>
+                      </a:r>
+                      <a:r>
+                        <a:rPr lang="en-GB" dirty="0"/>
+                        <a:t>’</a:t>
+                      </a:r>
+                    </a:p>
+                  </a:txBody>
+                  <a:tcPr/>
+                </a:tc>
+                <a:tc>
+                  <a:txBody>
+                    <a:bodyPr/>
+                    <a:lstStyle/>
+                    <a:p>
+                      <a:r>
+                        <a:rPr lang="en-GB" dirty="0"/>
+                        <a:t>3</a:t>
+                      </a:r>
+                      <a:endParaRPr lang="nl-NL" dirty="0"/>
+                    </a:p>
+                  </a:txBody>
+                  <a:tcPr/>
+                </a:tc>
+                <a:extLst>
+                  <a:ext uri="{0D108BD9-81ED-4DB2-BD59-A6C34878D82A}">
+                    <a16:rowId xmlns:a16="http://schemas.microsoft.com/office/drawing/2014/main" val="4065008442"/>
+                  </a:ext>
+                </a:extLst>
+              </a:tr>
+              <a:tr h="370840">
+                <a:tc>
+                  <a:txBody>
+                    <a:bodyPr/>
+                    <a:lstStyle/>
+                    <a:p>
+                      <a:pPr marL="0" marR="0" lvl="0" indent="0" algn="l" defTabSz="914400" rtl="0" eaLnBrk="1" fontAlgn="auto" latinLnBrk="0" hangingPunct="1">
+                        <a:lnSpc>
+                          <a:spcPct val="100000"/>
+                        </a:lnSpc>
+                        <a:spcBef>
+                          <a:spcPts val="0"/>
+                        </a:spcBef>
+                        <a:spcAft>
+                          <a:spcPts val="0"/>
+                        </a:spcAft>
+                        <a:buClrTx/>
+                        <a:buSzTx/>
+                        <a:buFontTx/>
+                        <a:buNone/>
+                        <a:tabLst/>
+                        <a:defRPr/>
+                      </a:pPr>
+                      <a:r>
+                        <a:rPr lang="en-GB" dirty="0"/>
+                        <a:t>‘age’</a:t>
+                      </a:r>
+                      <a:endParaRPr lang="nl-NL" dirty="0"/>
+                    </a:p>
+                  </a:txBody>
+                  <a:tcPr/>
+                </a:tc>
+                <a:tc>
+                  <a:txBody>
+                    <a:bodyPr/>
+                    <a:lstStyle/>
+                    <a:p>
+                      <a:r>
+                        <a:rPr lang="en-GB" dirty="0"/>
+                        <a:t>25</a:t>
+                      </a:r>
+                      <a:endParaRPr lang="nl-NL" dirty="0"/>
+                    </a:p>
+                  </a:txBody>
+                  <a:tcPr/>
+                </a:tc>
+                <a:extLst>
+                  <a:ext uri="{0D108BD9-81ED-4DB2-BD59-A6C34878D82A}">
+                    <a16:rowId xmlns:a16="http://schemas.microsoft.com/office/drawing/2014/main" val="3336908036"/>
+                  </a:ext>
+                </a:extLst>
+              </a:tr>
+              <a:tr h="370840">
+                <a:tc>
+                  <a:txBody>
+                    <a:bodyPr/>
+                    <a:lstStyle/>
+                    <a:p>
+                      <a:r>
+                        <a:rPr lang="en-GB" dirty="0"/>
+                        <a:t>‘</a:t>
+                      </a:r>
+                      <a:r>
+                        <a:rPr lang="en-GB" dirty="0" err="1"/>
+                        <a:t>is_verified</a:t>
+                      </a:r>
+                      <a:r>
+                        <a:rPr lang="en-GB" dirty="0"/>
+                        <a:t>’</a:t>
+                      </a:r>
+                      <a:endParaRPr lang="nl-NL" dirty="0"/>
+                    </a:p>
+                  </a:txBody>
+                  <a:tcPr/>
+                </a:tc>
+                <a:tc>
+                  <a:txBody>
+                    <a:bodyPr/>
+                    <a:lstStyle/>
+                    <a:p>
+                      <a:r>
+                        <a:rPr lang="en-GB" dirty="0"/>
+                        <a:t>true</a:t>
+                      </a:r>
+                      <a:endParaRPr lang="nl-NL" dirty="0"/>
+                    </a:p>
+                  </a:txBody>
+                  <a:tcPr/>
+                </a:tc>
+                <a:extLst>
+                  <a:ext uri="{0D108BD9-81ED-4DB2-BD59-A6C34878D82A}">
+                    <a16:rowId xmlns:a16="http://schemas.microsoft.com/office/drawing/2014/main" val="693893805"/>
+                  </a:ext>
+                </a:extLst>
+              </a:tr>
+              <a:tr h="370840">
+                <a:tc>
+                  <a:txBody>
+                    <a:bodyPr/>
+                    <a:lstStyle/>
+                    <a:p>
+                      <a:r>
+                        <a:rPr lang="nl-NL" dirty="0"/>
+                        <a:t>‘</a:t>
+                      </a:r>
+                      <a:r>
+                        <a:rPr lang="nl-NL" dirty="0" err="1"/>
+                        <a:t>user_category</a:t>
+                      </a:r>
+                      <a:r>
+                        <a:rPr lang="nl-NL" dirty="0"/>
+                        <a:t>’</a:t>
+                      </a:r>
+                    </a:p>
+                  </a:txBody>
+                  <a:tcPr/>
+                </a:tc>
+                <a:tc>
+                  <a:txBody>
+                    <a:bodyPr/>
+                    <a:lstStyle/>
+                    <a:p>
+                      <a:r>
+                        <a:rPr lang="nl-NL" dirty="0"/>
+                        <a:t>‘B’</a:t>
+                      </a:r>
+                    </a:p>
+                  </a:txBody>
+                  <a:tcPr/>
+                </a:tc>
+                <a:extLst>
+                  <a:ext uri="{0D108BD9-81ED-4DB2-BD59-A6C34878D82A}">
+                    <a16:rowId xmlns:a16="http://schemas.microsoft.com/office/drawing/2014/main" val="1971484313"/>
                   </a:ext>
                 </a:extLst>
               </a:tr>
@@ -4353,6 +4640,59 @@
                       </p:childTnLst>
                     </p:cTn>
                   </p:par>
+                  <p:par>
+                    <p:cTn id="21" fill="hold">
+                      <p:stCondLst>
+                        <p:cond delay="indefinite"/>
+                      </p:stCondLst>
+                      <p:childTnLst>
+                        <p:par>
+                          <p:cTn id="22" fill="hold">
+                            <p:stCondLst>
+                              <p:cond delay="0"/>
+                            </p:stCondLst>
+                            <p:childTnLst>
+                              <p:par>
+                                <p:cTn id="23" presetID="10" presetClass="entr" presetSubtype="0" fill="hold" nodeType="clickEffect">
+                                  <p:stCondLst>
+                                    <p:cond delay="0"/>
+                                  </p:stCondLst>
+                                  <p:childTnLst>
+                                    <p:set>
+                                      <p:cBhvr>
+                                        <p:cTn id="24" dur="1" fill="hold">
+                                          <p:stCondLst>
+                                            <p:cond delay="0"/>
+                                          </p:stCondLst>
+                                        </p:cTn>
+                                        <p:tgtEl>
+                                          <p:spTgt spid="9"/>
+                                        </p:tgtEl>
+                                        <p:attrNameLst>
+                                          <p:attrName>style.visibility</p:attrName>
+                                        </p:attrNameLst>
+                                      </p:cBhvr>
+                                      <p:to>
+                                        <p:strVal val="visible"/>
+                                      </p:to>
+                                    </p:set>
+                                    <p:animEffect transition="in" filter="fade">
+                                      <p:cBhvr>
+                                        <p:cTn id="25" dur="500"/>
+                                        <p:tgtEl>
+                                          <p:spTgt spid="9"/>
+                                        </p:tgtEl>
+                                      </p:cBhvr>
+                                    </p:animEffect>
+                                  </p:childTnLst>
+                                </p:cTn>
+                              </p:par>
+                            </p:childTnLst>
+                          </p:cTn>
+                        </p:par>
+                      </p:childTnLst>
+                    </p:cTn>
+                  </p:par>
                 </p:childTnLst>
               </p:cTn>
               <p:prevCondLst>
@@ -4503,10 +4843,10 @@
       </p:grpSpPr>
       <p:sp>
         <p:nvSpPr>
-          <p:cNvPr id="2" name="Title 1">
-            <a:extLst>
-              <a:ext uri="{FF2B5EF4-FFF2-40B4-BE49-F238E27FC236}">
-                <a16:creationId xmlns:a16="http://schemas.microsoft.com/office/drawing/2014/main" id="{3DA4B43A-A7FA-4475-A13A-D77AD7A54A92}"/>
+          <p:cNvPr id="2" name="Titel 1">
+            <a:extLst>
+              <a:ext uri="{FF2B5EF4-FFF2-40B4-BE49-F238E27FC236}">
+                <a16:creationId xmlns:a16="http://schemas.microsoft.com/office/drawing/2014/main" id="{C2CAD292-74AC-4BAB-A5A1-03F60B732B5E}"/>
               </a:ext>
             </a:extLst>
           </p:cNvPr>
@@ -4517,66 +4857,45 @@
             <p:ph type="title"/>
           </p:nvPr>
         </p:nvSpPr>
-        <p:spPr/>
-        <p:txBody>
-          <a:bodyPr/>
+        <p:spPr>
+          <a:xfrm>
+            <a:off x="838200" y="2766218"/>
+            <a:ext cx="10515600" cy="1325563"/>
+          </a:xfrm>
+        </p:spPr>
+        <p:txBody>
+          <a:bodyPr>
+            <a:normAutofit/>
+          </a:bodyPr>
           <a:lstStyle/>
           <a:p>
-            <a:endParaRPr lang="en-NL" dirty="0"/>
-          </a:p>
-        </p:txBody>
-      </p:sp>
-      <p:sp>
-        <p:nvSpPr>
-          <p:cNvPr id="3" name="Content Placeholder 2">
-            <a:extLst>
-              <a:ext uri="{FF2B5EF4-FFF2-40B4-BE49-F238E27FC236}">
-                <a16:creationId xmlns:a16="http://schemas.microsoft.com/office/drawing/2014/main" id="{30711452-300E-4F07-85F1-468B66A5BC4A}"/>
-              </a:ext>
-            </a:extLst>
-          </p:cNvPr>
-          <p:cNvSpPr>
-            <a:spLocks noGrp="1"/>
-          </p:cNvSpPr>
-          <p:nvPr>
-            <p:ph idx="1"/>
-          </p:nvPr>
-        </p:nvSpPr>
-        <p:spPr/>
-        <p:txBody>
-          <a:bodyPr/>
-          <a:lstStyle/>
-          <a:p>
-            <a:r>
-              <a:rPr lang="nl-NL" strike="sngStrike" dirty="0"/>
-              <a:t>Code voorbeelden Embedded</a:t>
-            </a:r>
-          </a:p>
-          <a:p>
-            <a:endParaRPr lang="nl-NL" dirty="0"/>
-          </a:p>
-          <a:p>
-            <a:r>
-              <a:rPr lang="nl-NL" dirty="0"/>
-              <a:t>Volgende slides volgorde logisch maken</a:t>
-            </a:r>
-          </a:p>
-          <a:p>
-            <a:endParaRPr lang="nl-NL" dirty="0"/>
-          </a:p>
-          <a:p>
-            <a:r>
-              <a:rPr lang="nl-NL" strike="sngStrike" dirty="0"/>
-              <a:t>Eindigen met remote</a:t>
-            </a:r>
-            <a:endParaRPr lang="en-NL" strike="sngStrike" dirty="0"/>
+            <a:pPr algn="ctr"/>
+            <a:r>
+              <a:rPr lang="en-GB" sz="8000" kern="1200" dirty="0">
+                <a:solidFill>
+                  <a:schemeClr val="tx1"/>
+                </a:solidFill>
+                <a:latin typeface="Bebas Neue" panose="020B0606020202050201" pitchFamily="34" charset="0"/>
+              </a:rPr>
+              <a:t>Code </a:t>
+            </a:r>
+            <a:r>
+              <a:rPr lang="en-GB" sz="8000" kern="1200" dirty="0" err="1">
+                <a:solidFill>
+                  <a:schemeClr val="tx1"/>
+                </a:solidFill>
+                <a:latin typeface="Bebas Neue" panose="020B0606020202050201" pitchFamily="34" charset="0"/>
+              </a:rPr>
+              <a:t>voorbeelden</a:t>
+            </a:r>
+            <a:endParaRPr lang="nl-NL" sz="8000" dirty="0"/>
           </a:p>
         </p:txBody>
       </p:sp>
     </p:spTree>
     <p:extLst>
       <p:ext uri="{BB962C8B-B14F-4D97-AF65-F5344CB8AC3E}">
-        <p14:creationId xmlns:p14="http://schemas.microsoft.com/office/powerpoint/2010/main" val="1038661948"/>
+        <p14:creationId xmlns:p14="http://schemas.microsoft.com/office/powerpoint/2010/main" val="2723697203"/>
       </p:ext>
     </p:extLst>
   </p:cSld>
@@ -4603,67 +4922,176 @@
           <a:chExt cx="0" cy="0"/>
         </a:xfrm>
       </p:grpSpPr>
-      <p:sp>
-        <p:nvSpPr>
-          <p:cNvPr id="2" name="Titel 1">
-            <a:extLst>
-              <a:ext uri="{FF2B5EF4-FFF2-40B4-BE49-F238E27FC236}">
-                <a16:creationId xmlns:a16="http://schemas.microsoft.com/office/drawing/2014/main" id="{C2CAD292-74AC-4BAB-A5A1-03F60B732B5E}"/>
-              </a:ext>
-            </a:extLst>
-          </p:cNvPr>
-          <p:cNvSpPr>
-            <a:spLocks noGrp="1"/>
-          </p:cNvSpPr>
-          <p:nvPr>
-            <p:ph type="title"/>
-          </p:nvPr>
-        </p:nvSpPr>
+      <p:pic>
+        <p:nvPicPr>
+          <p:cNvPr id="6" name="Content Placeholder 5" descr="Chart, box and whisker chart&#10;&#10;Description automatically generated">
+            <a:extLst>
+              <a:ext uri="{FF2B5EF4-FFF2-40B4-BE49-F238E27FC236}">
+                <a16:creationId xmlns:a16="http://schemas.microsoft.com/office/drawing/2014/main" id="{8416DD30-5D9A-4DA1-9C67-ADEFDA9F8250}"/>
+              </a:ext>
+            </a:extLst>
+          </p:cNvPr>
+          <p:cNvPicPr>
+            <a:picLocks noGrp="1" noChangeAspect="1"/>
+          </p:cNvPicPr>
+          <p:nvPr>
+            <p:ph idx="1"/>
+          </p:nvPr>
+        </p:nvPicPr>
+        <p:blipFill>
+          <a:blip r:embed="rId2">
+            <a:extLst>
+              <a:ext uri="{28A0092B-C50C-407E-A947-70E740481C1C}">
+                <a14:useLocalDpi xmlns:a14="http://schemas.microsoft.com/office/drawing/2010/main" val="0"/>
+              </a:ext>
+            </a:extLst>
+          </a:blip>
+          <a:stretch>
+            <a:fillRect/>
+          </a:stretch>
+        </p:blipFill>
         <p:spPr>
           <a:xfrm>
-            <a:off x="838200" y="2766218"/>
-            <a:ext cx="10515600" cy="1325563"/>
+            <a:off x="2679" y="1634987"/>
+            <a:ext cx="12189321" cy="3588026"/>
           </a:xfrm>
         </p:spPr>
-        <p:txBody>
-          <a:bodyPr>
-            <a:normAutofit/>
-          </a:bodyPr>
-          <a:lstStyle/>
-          <a:p>
-            <a:pPr algn="ctr"/>
-            <a:r>
-              <a:rPr lang="en-GB" sz="8000" kern="1200" dirty="0">
-                <a:solidFill>
-                  <a:schemeClr val="tx1"/>
-                </a:solidFill>
-                <a:latin typeface="Bebas Neue" panose="020B0606020202050201" pitchFamily="34" charset="0"/>
-              </a:rPr>
-              <a:t>Code </a:t>
-            </a:r>
-            <a:r>
-              <a:rPr lang="en-GB" sz="8000" kern="1200" dirty="0" err="1">
-                <a:solidFill>
-                  <a:schemeClr val="tx1"/>
-                </a:solidFill>
-                <a:latin typeface="Bebas Neue" panose="020B0606020202050201" pitchFamily="34" charset="0"/>
-              </a:rPr>
-              <a:t>voorbeelden</a:t>
-            </a:r>
-            <a:endParaRPr lang="nl-NL" sz="8000" dirty="0"/>
-          </a:p>
-        </p:txBody>
-      </p:sp>
+      </p:pic>
+      <p:cxnSp>
+        <p:nvCxnSpPr>
+          <p:cNvPr id="10" name="Straight Arrow Connector 9">
+            <a:extLst>
+              <a:ext uri="{FF2B5EF4-FFF2-40B4-BE49-F238E27FC236}">
+                <a16:creationId xmlns:a16="http://schemas.microsoft.com/office/drawing/2014/main" id="{427F6675-2C30-41DC-B866-F705C045053B}"/>
+              </a:ext>
+            </a:extLst>
+          </p:cNvPr>
+          <p:cNvCxnSpPr/>
+          <p:nvPr/>
+        </p:nvCxnSpPr>
+        <p:spPr>
+          <a:xfrm flipH="1">
+            <a:off x="5431536" y="3913632"/>
+            <a:ext cx="900000" cy="0"/>
+          </a:xfrm>
+          <a:prstGeom prst="straightConnector1">
+            <a:avLst/>
+          </a:prstGeom>
+          <a:ln w="76200">
+            <a:solidFill>
+              <a:schemeClr val="accent2"/>
+            </a:solidFill>
+            <a:tailEnd type="triangle"/>
+          </a:ln>
+        </p:spPr>
+        <p:style>
+          <a:lnRef idx="1">
+            <a:schemeClr val="accent1"/>
+          </a:lnRef>
+          <a:fillRef idx="0">
+            <a:schemeClr val="accent1"/>
+          </a:fillRef>
+          <a:effectRef idx="0">
+            <a:schemeClr val="accent1"/>
+          </a:effectRef>
+          <a:fontRef idx="minor">
+            <a:schemeClr val="tx1"/>
+          </a:fontRef>
+        </p:style>
+      </p:cxnSp>
     </p:spTree>
     <p:extLst>
       <p:ext uri="{BB962C8B-B14F-4D97-AF65-F5344CB8AC3E}">
-        <p14:creationId xmlns:p14="http://schemas.microsoft.com/office/powerpoint/2010/main" val="2723697203"/>
+        <p14:creationId xmlns:p14="http://schemas.microsoft.com/office/powerpoint/2010/main" val="3680424816"/>
       </p:ext>
     </p:extLst>
   </p:cSld>
   <p:clrMapOvr>
     <a:masterClrMapping/>
   </p:clrMapOvr>
+  <p:timing>
+    <p:tnLst>
+      <p:par>
+        <p:cTn id="1" dur="indefinite" restart="never" nodeType="tmRoot">
+          <p:childTnLst>
+            <p:seq concurrent="1" nextAc="seek">
+              <p:cTn id="2" dur="indefinite" nodeType="mainSeq">
+                <p:childTnLst>
+                  <p:par>
+                    <p:cTn id="3" fill="hold">
+                      <p:stCondLst>
+                        <p:cond delay="indefinite"/>
+                      </p:stCondLst>
+                      <p:childTnLst>
+                        <p:par>
+                          <p:cTn id="4" fill="hold">
+                            <p:stCondLst>
+                              <p:cond delay="0"/>
+                            </p:stCondLst>
+                            <p:childTnLst>
+                              <p:par>
+                                <p:cTn id="5" presetID="10" presetClass="entr" presetSubtype="0" fill="hold" nodeType="clickEffect">
+                                  <p:stCondLst>
+                                    <p:cond delay="0"/>
+                                  </p:stCondLst>
+                                  <p:childTnLst>
+                                    <p:set>
+                                      <p:cBhvr>
+                                        <p:cTn id="6" dur="1" fill="hold">
+                                          <p:stCondLst>
+                                            <p:cond delay="0"/>
+                                          </p:stCondLst>
+                                        </p:cTn>
+                                        <p:tgtEl>
+                                          <p:spTgt spid="10"/>
+                                        </p:tgtEl>
+                                        <p:attrNameLst>
+                                          <p:attrName>style.visibility</p:attrName>
+                                        </p:attrNameLst>
+                                      </p:cBhvr>
+                                      <p:to>
+                                        <p:strVal val="visible"/>
+                                      </p:to>
+                                    </p:set>
+                                    <p:animEffect transition="in" filter="fade">
+                                      <p:cBhvr>
+                                        <p:cTn id="7" dur="500"/>
+                                        <p:tgtEl>
+                                          <p:spTgt spid="10"/>
+                                        </p:tgtEl>
+                                      </p:cBhvr>
+                                    </p:animEffect>
+                                  </p:childTnLst>
+                                </p:cTn>
+                              </p:par>
+                            </p:childTnLst>
+                          </p:cTn>
+                        </p:par>
+                      </p:childTnLst>
+                    </p:cTn>
+                  </p:par>
+                </p:childTnLst>
+              </p:cTn>
+              <p:prevCondLst>
+                <p:cond evt="onPrev" delay="0">
+                  <p:tgtEl>
+                    <p:sldTgt/>
+                  </p:tgtEl>
+                </p:cond>
+              </p:prevCondLst>
+              <p:nextCondLst>
+                <p:cond evt="onNext" delay="0">
+                  <p:tgtEl>
+                    <p:sldTgt/>
+                  </p:tgtEl>
+                </p:cond>
+              </p:nextCondLst>
+            </p:seq>
+          </p:childTnLst>
+        </p:cTn>
+      </p:par>
+    </p:tnLst>
+  </p:timing>
 </p:sld>
 </file>
 
@@ -4684,17 +5112,42 @@
           <a:chExt cx="0" cy="0"/>
         </a:xfrm>
       </p:grpSpPr>
+      <p:sp>
+        <p:nvSpPr>
+          <p:cNvPr id="2" name="Titel 1">
+            <a:extLst>
+              <a:ext uri="{FF2B5EF4-FFF2-40B4-BE49-F238E27FC236}">
+                <a16:creationId xmlns:a16="http://schemas.microsoft.com/office/drawing/2014/main" id="{A831B199-1F25-4357-8FBE-03A4C948DF5D}"/>
+              </a:ext>
+            </a:extLst>
+          </p:cNvPr>
+          <p:cNvSpPr>
+            <a:spLocks noGrp="1"/>
+          </p:cNvSpPr>
+          <p:nvPr>
+            <p:ph type="title"/>
+          </p:nvPr>
+        </p:nvSpPr>
+        <p:spPr/>
+        <p:txBody>
+          <a:bodyPr/>
+          <a:lstStyle/>
+          <a:p>
+            <a:endParaRPr lang="nl-NL"/>
+          </a:p>
+        </p:txBody>
+      </p:sp>
       <p:pic>
         <p:nvPicPr>
-          <p:cNvPr id="5" name="Tijdelijke aanduiding voor inhoud 4">
-            <a:extLst>
-              <a:ext uri="{FF2B5EF4-FFF2-40B4-BE49-F238E27FC236}">
-                <a16:creationId xmlns:a16="http://schemas.microsoft.com/office/drawing/2014/main" id="{13F06A30-DD1A-4AB8-B257-9D5046F740E1}"/>
+          <p:cNvPr id="2050" name="Picture 2">
+            <a:extLst>
+              <a:ext uri="{FF2B5EF4-FFF2-40B4-BE49-F238E27FC236}">
+                <a16:creationId xmlns:a16="http://schemas.microsoft.com/office/drawing/2014/main" id="{F605C389-7DAE-4DD7-BCB8-C71D13BCF565}"/>
               </a:ext>
             </a:extLst>
           </p:cNvPr>
           <p:cNvPicPr>
-            <a:picLocks noGrp="1" noChangeAspect="1"/>
+            <a:picLocks noGrp="1" noChangeAspect="1" noChangeArrowheads="1"/>
           </p:cNvPicPr>
           <p:nvPr>
             <p:ph idx="1"/>
@@ -4708,20 +5161,33 @@
               </a:ext>
             </a:extLst>
           </a:blip>
-          <a:srcRect r="38642"/>
+          <a:srcRect r="33936"/>
           <a:stretch/>
         </p:blipFill>
-        <p:spPr>
+        <p:spPr bwMode="auto">
           <a:xfrm>
-            <a:off x="773137" y="875419"/>
-            <a:ext cx="10645726" cy="5107161"/>
+            <a:off x="2" y="0"/>
+            <a:ext cx="12191998" cy="6857999"/>
           </a:xfrm>
+          <a:prstGeom prst="rect">
+            <a:avLst/>
+          </a:prstGeom>
+          <a:noFill/>
+          <a:extLst>
+            <a:ext uri="{909E8E84-426E-40DD-AFC4-6F175D3DCCD1}">
+              <a14:hiddenFill xmlns:a14="http://schemas.microsoft.com/office/drawing/2010/main">
+                <a:solidFill>
+                  <a:srgbClr val="FFFFFF"/>
+                </a:solidFill>
+              </a14:hiddenFill>
+            </a:ext>
+          </a:extLst>
         </p:spPr>
       </p:pic>
     </p:spTree>
     <p:extLst>
       <p:ext uri="{BB962C8B-B14F-4D97-AF65-F5344CB8AC3E}">
-        <p14:creationId xmlns:p14="http://schemas.microsoft.com/office/powerpoint/2010/main" val="3680424816"/>
+        <p14:creationId xmlns:p14="http://schemas.microsoft.com/office/powerpoint/2010/main" val="959338977"/>
       </p:ext>
     </p:extLst>
   </p:cSld>
@@ -4852,10 +5318,10 @@
       </p:grpSpPr>
       <p:sp>
         <p:nvSpPr>
-          <p:cNvPr id="2" name="Titel 1">
-            <a:extLst>
-              <a:ext uri="{FF2B5EF4-FFF2-40B4-BE49-F238E27FC236}">
-                <a16:creationId xmlns:a16="http://schemas.microsoft.com/office/drawing/2014/main" id="{A831B199-1F25-4357-8FBE-03A4C948DF5D}"/>
+          <p:cNvPr id="2" name="Title 1">
+            <a:extLst>
+              <a:ext uri="{FF2B5EF4-FFF2-40B4-BE49-F238E27FC236}">
+                <a16:creationId xmlns:a16="http://schemas.microsoft.com/office/drawing/2014/main" id="{0691D7DC-E536-45F7-986E-16E382E8B0AD}"/>
               </a:ext>
             </a:extLst>
           </p:cNvPr>
@@ -4868,240 +5334,30 @@
         </p:nvSpPr>
         <p:spPr/>
         <p:txBody>
-          <a:bodyPr/>
-          <a:lstStyle/>
-          <a:p>
-            <a:endParaRPr lang="nl-NL"/>
-          </a:p>
-        </p:txBody>
-      </p:sp>
-      <p:pic>
-        <p:nvPicPr>
-          <p:cNvPr id="2050" name="Picture 2">
-            <a:extLst>
-              <a:ext uri="{FF2B5EF4-FFF2-40B4-BE49-F238E27FC236}">
-                <a16:creationId xmlns:a16="http://schemas.microsoft.com/office/drawing/2014/main" id="{F605C389-7DAE-4DD7-BCB8-C71D13BCF565}"/>
-              </a:ext>
-            </a:extLst>
-          </p:cNvPr>
-          <p:cNvPicPr>
-            <a:picLocks noGrp="1" noChangeAspect="1" noChangeArrowheads="1"/>
-          </p:cNvPicPr>
-          <p:nvPr>
-            <p:ph idx="1"/>
-          </p:nvPr>
-        </p:nvPicPr>
-        <p:blipFill rotWithShape="1">
-          <a:blip r:embed="rId2">
-            <a:extLst>
-              <a:ext uri="{28A0092B-C50C-407E-A947-70E740481C1C}">
-                <a14:useLocalDpi xmlns:a14="http://schemas.microsoft.com/office/drawing/2010/main" val="0"/>
-              </a:ext>
-            </a:extLst>
-          </a:blip>
-          <a:srcRect r="33936"/>
-          <a:stretch/>
-        </p:blipFill>
-        <p:spPr bwMode="auto">
-          <a:xfrm>
-            <a:off x="2" y="0"/>
-            <a:ext cx="12191998" cy="6857999"/>
-          </a:xfrm>
-          <a:prstGeom prst="rect">
-            <a:avLst/>
-          </a:prstGeom>
-          <a:noFill/>
-          <a:extLst>
-            <a:ext uri="{909E8E84-426E-40DD-AFC4-6F175D3DCCD1}">
-              <a14:hiddenFill xmlns:a14="http://schemas.microsoft.com/office/drawing/2010/main">
-                <a:solidFill>
-                  <a:srgbClr val="FFFFFF"/>
-                </a:solidFill>
-              </a14:hiddenFill>
-            </a:ext>
-          </a:extLst>
-        </p:spPr>
-      </p:pic>
-    </p:spTree>
-    <p:extLst>
-      <p:ext uri="{BB962C8B-B14F-4D97-AF65-F5344CB8AC3E}">
-        <p14:creationId xmlns:p14="http://schemas.microsoft.com/office/powerpoint/2010/main" val="959338977"/>
-      </p:ext>
-    </p:extLst>
-  </p:cSld>
-  <p:clrMapOvr>
-    <a:masterClrMapping/>
-  </p:clrMapOvr>
-</p:sld>
-</file>
-
-<file path=ppt/slides/slide2.xml><?xml version="1.0" encoding="utf-8"?>
-<p:sld xmlns:a="http://schemas.openxmlformats.org/drawingml/2006/main" xmlns:r="http://schemas.openxmlformats.org/officeDocument/2006/relationships" xmlns:p="http://schemas.openxmlformats.org/presentationml/2006/main">
-  <p:cSld>
-    <p:bg>
-      <p:bgPr>
-        <a:solidFill>
-          <a:schemeClr val="bg1"/>
-        </a:solidFill>
-        <a:effectLst/>
-      </p:bgPr>
-    </p:bg>
-    <p:spTree>
-      <p:nvGrpSpPr>
-        <p:cNvPr id="1" name=""/>
-        <p:cNvGrpSpPr/>
-        <p:nvPr/>
-      </p:nvGrpSpPr>
-      <p:grpSpPr>
-        <a:xfrm>
-          <a:off x="0" y="0"/>
-          <a:ext cx="0" cy="0"/>
-          <a:chOff x="0" y="0"/>
-          <a:chExt cx="0" cy="0"/>
-        </a:xfrm>
-      </p:grpSpPr>
-      <p:sp useBgFill="1">
-        <p:nvSpPr>
-          <p:cNvPr id="16" name="Rectangle 15">
-            <a:extLst>
-              <a:ext uri="{FF2B5EF4-FFF2-40B4-BE49-F238E27FC236}">
-                <a16:creationId xmlns:a16="http://schemas.microsoft.com/office/drawing/2014/main" id="{72018E1B-E0B9-4440-AFF3-4112E50A2763}"/>
-              </a:ext>
-              <a:ext uri="{C183D7F6-B498-43B3-948B-1728B52AA6E4}">
-                <adec:decorative xmlns:adec="http://schemas.microsoft.com/office/drawing/2017/decorative" val="1"/>
-              </a:ext>
-            </a:extLst>
-          </p:cNvPr>
-          <p:cNvSpPr>
-            <a:spLocks noGrp="1" noRot="1" noChangeAspect="1" noMove="1" noResize="1" noEditPoints="1" noAdjustHandles="1" noChangeArrowheads="1" noChangeShapeType="1" noTextEdit="1"/>
-          </p:cNvSpPr>
-          <p:nvPr>
-            <p:extLst>
-              <p:ext uri="{386F3935-93C4-4BCD-93E2-E3B085C9AB24}">
-                <p16:designElem xmlns:p16="http://schemas.microsoft.com/office/powerpoint/2015/main" val="1"/>
-              </p:ext>
-            </p:extLst>
-          </p:nvPr>
-        </p:nvSpPr>
-        <p:spPr>
-          <a:xfrm>
-            <a:off x="-1" y="0"/>
-            <a:ext cx="12188952" cy="6858000"/>
-          </a:xfrm>
-          <a:prstGeom prst="rect">
-            <a:avLst/>
-          </a:prstGeom>
-          <a:ln>
-            <a:noFill/>
-          </a:ln>
-        </p:spPr>
-        <p:style>
-          <a:lnRef idx="2">
-            <a:schemeClr val="accent1">
-              <a:shade val="50000"/>
-            </a:schemeClr>
-          </a:lnRef>
-          <a:fillRef idx="1">
-            <a:schemeClr val="accent1"/>
-          </a:fillRef>
-          <a:effectRef idx="0">
-            <a:schemeClr val="accent1"/>
-          </a:effectRef>
-          <a:fontRef idx="minor">
-            <a:schemeClr val="lt1"/>
-          </a:fontRef>
-        </p:style>
-        <p:txBody>
-          <a:bodyPr rtlCol="0" anchor="ctr"/>
-          <a:lstStyle/>
-          <a:p>
-            <a:pPr algn="ctr"/>
-            <a:endParaRPr lang="en-US"/>
-          </a:p>
-        </p:txBody>
-      </p:sp>
-      <p:sp>
-        <p:nvSpPr>
-          <p:cNvPr id="2" name="Title 1">
-            <a:extLst>
-              <a:ext uri="{FF2B5EF4-FFF2-40B4-BE49-F238E27FC236}">
-                <a16:creationId xmlns:a16="http://schemas.microsoft.com/office/drawing/2014/main" id="{6333E71F-A146-4372-AD88-36C62F0E54A7}"/>
-              </a:ext>
-            </a:extLst>
-          </p:cNvPr>
-          <p:cNvSpPr>
-            <a:spLocks noGrp="1"/>
-          </p:cNvSpPr>
-          <p:nvPr>
-            <p:ph type="title"/>
-          </p:nvPr>
-        </p:nvSpPr>
-        <p:spPr>
-          <a:xfrm>
-            <a:off x="838200" y="386143"/>
-            <a:ext cx="10515600" cy="1840010"/>
-          </a:xfrm>
-        </p:spPr>
-        <p:txBody>
-          <a:bodyPr vert="horz" lIns="91440" tIns="45720" rIns="91440" bIns="45720" rtlCol="0" anchor="ctr">
+          <a:bodyPr>
             <a:normAutofit/>
           </a:bodyPr>
           <a:lstStyle/>
           <a:p>
             <a:r>
-              <a:rPr lang="en-US" sz="7200" kern="1200" dirty="0">
+              <a:rPr lang="en-GB" sz="6000" kern="1200" dirty="0">
                 <a:solidFill>
                   <a:schemeClr val="tx1"/>
                 </a:solidFill>
                 <a:latin typeface="Bebas Neue" panose="020B0606020202050201" pitchFamily="34" charset="0"/>
               </a:rPr>
-              <a:t>Wie </a:t>
-            </a:r>
-            <a:r>
-              <a:rPr lang="en-US" sz="7200" kern="1200" dirty="0" err="1">
-                <a:solidFill>
-                  <a:schemeClr val="tx1"/>
-                </a:solidFill>
-                <a:latin typeface="Bebas Neue" panose="020B0606020202050201" pitchFamily="34" charset="0"/>
-              </a:rPr>
-              <a:t>zijn</a:t>
-            </a:r>
-            <a:r>
-              <a:rPr lang="en-US" sz="7200" kern="1200" dirty="0">
-                <a:solidFill>
-                  <a:schemeClr val="tx1"/>
-                </a:solidFill>
-                <a:latin typeface="Bebas Neue" panose="020B0606020202050201" pitchFamily="34" charset="0"/>
-              </a:rPr>
-              <a:t> </a:t>
-            </a:r>
-            <a:r>
-              <a:rPr lang="en-US" sz="7200" kern="1200" dirty="0" err="1">
-                <a:solidFill>
-                  <a:schemeClr val="tx1"/>
-                </a:solidFill>
-                <a:latin typeface="Bebas Neue" panose="020B0606020202050201" pitchFamily="34" charset="0"/>
-              </a:rPr>
-              <a:t>wij</a:t>
-            </a:r>
-            <a:r>
-              <a:rPr lang="en-US" sz="7200" kern="1200" dirty="0">
-                <a:solidFill>
-                  <a:schemeClr val="tx1"/>
-                </a:solidFill>
-                <a:latin typeface="Bebas Neue" panose="020B0606020202050201" pitchFamily="34" charset="0"/>
-              </a:rPr>
-              <a:t>?</a:t>
-            </a:r>
+              <a:t>Deployment</a:t>
+            </a:r>
+            <a:endParaRPr lang="en-NL" sz="6000" dirty="0"/>
           </a:p>
         </p:txBody>
       </p:sp>
       <p:pic>
         <p:nvPicPr>
-          <p:cNvPr id="5" name="Content Placeholder 4" descr="A person with curly hair&#10;&#10;Description automatically generated with low confidence">
-            <a:extLst>
-              <a:ext uri="{FF2B5EF4-FFF2-40B4-BE49-F238E27FC236}">
-                <a16:creationId xmlns:a16="http://schemas.microsoft.com/office/drawing/2014/main" id="{E82E6C44-7EA1-4FA0-A7E6-70B90FD6021C}"/>
+          <p:cNvPr id="5" name="Content Placeholder 4" descr="Diagram&#10;&#10;Description automatically generated">
+            <a:extLst>
+              <a:ext uri="{FF2B5EF4-FFF2-40B4-BE49-F238E27FC236}">
+                <a16:creationId xmlns:a16="http://schemas.microsoft.com/office/drawing/2014/main" id="{2F1D4CA8-E4F5-4869-B47C-4B036A124B2D}"/>
               </a:ext>
             </a:extLst>
           </p:cNvPr>
@@ -5120,25 +5376,22 @@
               </a:ext>
             </a:extLst>
           </a:blip>
-          <a:srcRect l="2225"/>
+          <a:srcRect t="8692" r="4744" b="4841"/>
           <a:stretch/>
         </p:blipFill>
         <p:spPr>
           <a:xfrm>
-            <a:off x="587399" y="2226153"/>
-            <a:ext cx="2326834" cy="3070688"/>
+            <a:off x="461805" y="2393866"/>
+            <a:ext cx="5497035" cy="2627679"/>
           </a:xfrm>
-          <a:prstGeom prst="rect">
-            <a:avLst/>
-          </a:prstGeom>
         </p:spPr>
       </p:pic>
       <p:pic>
         <p:nvPicPr>
-          <p:cNvPr id="11" name="Picture 10" descr="A person smiling for the camera&#10;&#10;Description automatically generated with medium confidence">
-            <a:extLst>
-              <a:ext uri="{FF2B5EF4-FFF2-40B4-BE49-F238E27FC236}">
-                <a16:creationId xmlns:a16="http://schemas.microsoft.com/office/drawing/2014/main" id="{8241B7D5-3613-4C44-9E19-CB51FB1CB98E}"/>
+          <p:cNvPr id="7" name="Picture 6" descr="Diagram&#10;&#10;Description automatically generated">
+            <a:extLst>
+              <a:ext uri="{FF2B5EF4-FFF2-40B4-BE49-F238E27FC236}">
+                <a16:creationId xmlns:a16="http://schemas.microsoft.com/office/drawing/2014/main" id="{3E053354-9816-4B70-BD58-E4A32EA8858D}"/>
               </a:ext>
             </a:extLst>
           </p:cNvPr>
@@ -5155,402 +5408,13 @@
               </a:ext>
             </a:extLst>
           </a:blip>
-          <a:srcRect l="306" r="1922" b="3"/>
-          <a:stretch/>
-        </p:blipFill>
-        <p:spPr>
-          <a:xfrm>
-            <a:off x="3496665" y="2226153"/>
-            <a:ext cx="2326834" cy="3070688"/>
-          </a:xfrm>
-          <a:prstGeom prst="rect">
-            <a:avLst/>
-          </a:prstGeom>
-        </p:spPr>
-      </p:pic>
-      <p:pic>
-        <p:nvPicPr>
-          <p:cNvPr id="7" name="Picture 6" descr="A person smiling for the camera&#10;&#10;Description automatically generated with medium confidence">
-            <a:extLst>
-              <a:ext uri="{FF2B5EF4-FFF2-40B4-BE49-F238E27FC236}">
-                <a16:creationId xmlns:a16="http://schemas.microsoft.com/office/drawing/2014/main" id="{BBCA21E5-9850-4AAD-BBA8-CC7E422D66CE}"/>
-              </a:ext>
-            </a:extLst>
-          </p:cNvPr>
-          <p:cNvPicPr>
-            <a:picLocks noChangeAspect="1"/>
-          </p:cNvPicPr>
-          <p:nvPr/>
-        </p:nvPicPr>
-        <p:blipFill rotWithShape="1">
-          <a:blip r:embed="rId4">
-            <a:extLst>
-              <a:ext uri="{28A0092B-C50C-407E-A947-70E740481C1C}">
-                <a14:useLocalDpi xmlns:a14="http://schemas.microsoft.com/office/drawing/2010/main" val="0"/>
-              </a:ext>
-            </a:extLst>
-          </a:blip>
-          <a:srcRect l="2225" r="3" b="3"/>
-          <a:stretch/>
-        </p:blipFill>
-        <p:spPr>
-          <a:xfrm>
-            <a:off x="6405931" y="2226153"/>
-            <a:ext cx="2326834" cy="3070688"/>
-          </a:xfrm>
-          <a:prstGeom prst="rect">
-            <a:avLst/>
-          </a:prstGeom>
-        </p:spPr>
-      </p:pic>
-      <p:pic>
-        <p:nvPicPr>
-          <p:cNvPr id="9" name="Picture 8" descr="A person smiling outside&#10;&#10;Description automatically generated with low confidence">
-            <a:extLst>
-              <a:ext uri="{FF2B5EF4-FFF2-40B4-BE49-F238E27FC236}">
-                <a16:creationId xmlns:a16="http://schemas.microsoft.com/office/drawing/2014/main" id="{03234BE0-2E76-48DA-AE9E-A9D68B277F26}"/>
-              </a:ext>
-            </a:extLst>
-          </p:cNvPr>
-          <p:cNvPicPr>
-            <a:picLocks noChangeAspect="1"/>
-          </p:cNvPicPr>
-          <p:nvPr/>
-        </p:nvPicPr>
-        <p:blipFill rotWithShape="1">
-          <a:blip r:embed="rId5">
-            <a:extLst>
-              <a:ext uri="{28A0092B-C50C-407E-A947-70E740481C1C}">
-                <a14:useLocalDpi xmlns:a14="http://schemas.microsoft.com/office/drawing/2010/main" val="0"/>
-              </a:ext>
-            </a:extLst>
-          </a:blip>
-          <a:srcRect l="6261" r="22508" b="-2"/>
-          <a:stretch/>
-        </p:blipFill>
-        <p:spPr>
-          <a:xfrm>
-            <a:off x="9315196" y="2226153"/>
-            <a:ext cx="2326834" cy="3070688"/>
-          </a:xfrm>
-          <a:prstGeom prst="rect">
-            <a:avLst/>
-          </a:prstGeom>
-        </p:spPr>
-      </p:pic>
-      <p:sp>
-        <p:nvSpPr>
-          <p:cNvPr id="12" name="TextBox 11">
-            <a:extLst>
-              <a:ext uri="{FF2B5EF4-FFF2-40B4-BE49-F238E27FC236}">
-                <a16:creationId xmlns:a16="http://schemas.microsoft.com/office/drawing/2014/main" id="{8745C667-21B6-4572-BD84-0CFCFA11B8FB}"/>
-              </a:ext>
-            </a:extLst>
-          </p:cNvPr>
-          <p:cNvSpPr txBox="1"/>
-          <p:nvPr/>
-        </p:nvSpPr>
-        <p:spPr>
-          <a:xfrm>
-            <a:off x="668914" y="5548586"/>
-            <a:ext cx="2172502" cy="369332"/>
-          </a:xfrm>
-          <a:prstGeom prst="rect">
-            <a:avLst/>
-          </a:prstGeom>
-          <a:noFill/>
-        </p:spPr>
-        <p:txBody>
-          <a:bodyPr wrap="square" rtlCol="0">
-            <a:spAutoFit/>
-          </a:bodyPr>
-          <a:lstStyle/>
-          <a:p>
-            <a:pPr algn="ctr"/>
-            <a:r>
-              <a:rPr lang="nl-NL" dirty="0"/>
-              <a:t>Egbert-Jan Terpstra</a:t>
-            </a:r>
-            <a:endParaRPr lang="en-NL" dirty="0"/>
-          </a:p>
-        </p:txBody>
-      </p:sp>
-      <p:sp>
-        <p:nvSpPr>
-          <p:cNvPr id="14" name="TextBox 13">
-            <a:extLst>
-              <a:ext uri="{FF2B5EF4-FFF2-40B4-BE49-F238E27FC236}">
-                <a16:creationId xmlns:a16="http://schemas.microsoft.com/office/drawing/2014/main" id="{C4C087DF-F75F-475C-BEAC-DDA29D7EEE1F}"/>
-              </a:ext>
-            </a:extLst>
-          </p:cNvPr>
-          <p:cNvSpPr txBox="1"/>
-          <p:nvPr/>
-        </p:nvSpPr>
-        <p:spPr>
-          <a:xfrm>
-            <a:off x="3496665" y="5566384"/>
-            <a:ext cx="2172502" cy="369332"/>
-          </a:xfrm>
-          <a:prstGeom prst="rect">
-            <a:avLst/>
-          </a:prstGeom>
-          <a:noFill/>
-        </p:spPr>
-        <p:txBody>
-          <a:bodyPr wrap="square" rtlCol="0">
-            <a:spAutoFit/>
-          </a:bodyPr>
-          <a:lstStyle/>
-          <a:p>
-            <a:pPr algn="ctr"/>
-            <a:r>
-              <a:rPr lang="nl-NL" dirty="0"/>
-              <a:t>Sem Hones</a:t>
-            </a:r>
-            <a:endParaRPr lang="en-NL" dirty="0"/>
-          </a:p>
-        </p:txBody>
-      </p:sp>
-      <p:sp>
-        <p:nvSpPr>
-          <p:cNvPr id="15" name="TextBox 14">
-            <a:extLst>
-              <a:ext uri="{FF2B5EF4-FFF2-40B4-BE49-F238E27FC236}">
-                <a16:creationId xmlns:a16="http://schemas.microsoft.com/office/drawing/2014/main" id="{4012EBA7-3385-4299-BA95-4E88D5A0B77A}"/>
-              </a:ext>
-            </a:extLst>
-          </p:cNvPr>
-          <p:cNvSpPr txBox="1"/>
-          <p:nvPr/>
-        </p:nvSpPr>
-        <p:spPr>
-          <a:xfrm>
-            <a:off x="6560263" y="5566384"/>
-            <a:ext cx="2172502" cy="369332"/>
-          </a:xfrm>
-          <a:prstGeom prst="rect">
-            <a:avLst/>
-          </a:prstGeom>
-          <a:noFill/>
-        </p:spPr>
-        <p:txBody>
-          <a:bodyPr wrap="square" rtlCol="0">
-            <a:spAutoFit/>
-          </a:bodyPr>
-          <a:lstStyle/>
-          <a:p>
-            <a:pPr algn="ctr"/>
-            <a:r>
-              <a:rPr lang="nl-NL" dirty="0"/>
-              <a:t>Dennis Vlaanderen</a:t>
-            </a:r>
-            <a:endParaRPr lang="en-NL" dirty="0"/>
-          </a:p>
-        </p:txBody>
-      </p:sp>
-      <p:sp>
-        <p:nvSpPr>
-          <p:cNvPr id="17" name="TextBox 16">
-            <a:extLst>
-              <a:ext uri="{FF2B5EF4-FFF2-40B4-BE49-F238E27FC236}">
-                <a16:creationId xmlns:a16="http://schemas.microsoft.com/office/drawing/2014/main" id="{B877481F-BBC4-47EE-B309-AC618DB5B8E0}"/>
-              </a:ext>
-            </a:extLst>
-          </p:cNvPr>
-          <p:cNvSpPr txBox="1"/>
-          <p:nvPr/>
-        </p:nvSpPr>
-        <p:spPr>
-          <a:xfrm>
-            <a:off x="9392362" y="5566384"/>
-            <a:ext cx="2172502" cy="369332"/>
-          </a:xfrm>
-          <a:prstGeom prst="rect">
-            <a:avLst/>
-          </a:prstGeom>
-          <a:noFill/>
-        </p:spPr>
-        <p:txBody>
-          <a:bodyPr wrap="square" rtlCol="0">
-            <a:spAutoFit/>
-          </a:bodyPr>
-          <a:lstStyle/>
-          <a:p>
-            <a:pPr algn="ctr"/>
-            <a:r>
-              <a:rPr lang="nl-NL" dirty="0"/>
-              <a:t>Thom Kraaijvanger</a:t>
-            </a:r>
-            <a:endParaRPr lang="en-NL" dirty="0"/>
-          </a:p>
-        </p:txBody>
-      </p:sp>
-    </p:spTree>
-    <p:extLst>
-      <p:ext uri="{BB962C8B-B14F-4D97-AF65-F5344CB8AC3E}">
-        <p14:creationId xmlns:p14="http://schemas.microsoft.com/office/powerpoint/2010/main" val="3702475179"/>
-      </p:ext>
-    </p:extLst>
-  </p:cSld>
-  <p:clrMapOvr>
-    <a:masterClrMapping/>
-  </p:clrMapOvr>
-</p:sld>
-</file>
-
-<file path=ppt/slides/slide20.xml><?xml version="1.0" encoding="utf-8"?>
-<p:sld xmlns:a="http://schemas.openxmlformats.org/drawingml/2006/main" xmlns:r="http://schemas.openxmlformats.org/officeDocument/2006/relationships" xmlns:p="http://schemas.openxmlformats.org/presentationml/2006/main">
-  <p:cSld>
-    <p:spTree>
-      <p:nvGrpSpPr>
-        <p:cNvPr id="1" name=""/>
-        <p:cNvGrpSpPr/>
-        <p:nvPr/>
-      </p:nvGrpSpPr>
-      <p:grpSpPr>
-        <a:xfrm>
-          <a:off x="0" y="0"/>
-          <a:ext cx="0" cy="0"/>
-          <a:chOff x="0" y="0"/>
-          <a:chExt cx="0" cy="0"/>
-        </a:xfrm>
-      </p:grpSpPr>
-      <p:sp>
-        <p:nvSpPr>
-          <p:cNvPr id="2" name="Title 1">
-            <a:extLst>
-              <a:ext uri="{FF2B5EF4-FFF2-40B4-BE49-F238E27FC236}">
-                <a16:creationId xmlns:a16="http://schemas.microsoft.com/office/drawing/2014/main" id="{0691D7DC-E536-45F7-986E-16E382E8B0AD}"/>
-              </a:ext>
-            </a:extLst>
-          </p:cNvPr>
-          <p:cNvSpPr>
-            <a:spLocks noGrp="1"/>
-          </p:cNvSpPr>
-          <p:nvPr>
-            <p:ph type="title"/>
-          </p:nvPr>
-        </p:nvSpPr>
-        <p:spPr/>
-        <p:txBody>
-          <a:bodyPr>
-            <a:normAutofit/>
-          </a:bodyPr>
-          <a:lstStyle/>
-          <a:p>
-            <a:r>
-              <a:rPr lang="en-GB" sz="6000" kern="1200" dirty="0">
-                <a:solidFill>
-                  <a:schemeClr val="tx1"/>
-                </a:solidFill>
-                <a:latin typeface="Bebas Neue" panose="020B0606020202050201" pitchFamily="34" charset="0"/>
-              </a:rPr>
-              <a:t>Deployment</a:t>
-            </a:r>
-            <a:endParaRPr lang="en-NL" sz="6000" dirty="0"/>
-          </a:p>
-        </p:txBody>
-      </p:sp>
-      <p:pic>
-        <p:nvPicPr>
-          <p:cNvPr id="5" name="Content Placeholder 4" descr="Diagram&#10;&#10;Description automatically generated">
-            <a:extLst>
-              <a:ext uri="{FF2B5EF4-FFF2-40B4-BE49-F238E27FC236}">
-                <a16:creationId xmlns:a16="http://schemas.microsoft.com/office/drawing/2014/main" id="{2F1D4CA8-E4F5-4869-B47C-4B036A124B2D}"/>
-              </a:ext>
-            </a:extLst>
-          </p:cNvPr>
-          <p:cNvPicPr>
-            <a:picLocks noGrp="1" noChangeAspect="1"/>
-          </p:cNvPicPr>
-          <p:nvPr>
-            <p:ph idx="1"/>
-          </p:nvPr>
-        </p:nvPicPr>
-        <p:blipFill rotWithShape="1">
-          <a:blip r:embed="rId2">
-            <a:extLst>
-              <a:ext uri="{28A0092B-C50C-407E-A947-70E740481C1C}">
-                <a14:useLocalDpi xmlns:a14="http://schemas.microsoft.com/office/drawing/2010/main" val="0"/>
-              </a:ext>
-            </a:extLst>
-          </a:blip>
-          <a:srcRect t="8692" r="4744" b="4841"/>
-          <a:stretch/>
-        </p:blipFill>
-        <p:spPr>
-          <a:xfrm>
-            <a:off x="5856765" y="591917"/>
-            <a:ext cx="4597197" cy="2197541"/>
-          </a:xfrm>
-        </p:spPr>
-      </p:pic>
-      <p:pic>
-        <p:nvPicPr>
-          <p:cNvPr id="7" name="Picture 6" descr="Diagram&#10;&#10;Description automatically generated">
-            <a:extLst>
-              <a:ext uri="{FF2B5EF4-FFF2-40B4-BE49-F238E27FC236}">
-                <a16:creationId xmlns:a16="http://schemas.microsoft.com/office/drawing/2014/main" id="{3E053354-9816-4B70-BD58-E4A32EA8858D}"/>
-              </a:ext>
-            </a:extLst>
-          </p:cNvPr>
-          <p:cNvPicPr>
-            <a:picLocks noChangeAspect="1"/>
-          </p:cNvPicPr>
-          <p:nvPr/>
-        </p:nvPicPr>
-        <p:blipFill rotWithShape="1">
-          <a:blip r:embed="rId3">
-            <a:extLst>
-              <a:ext uri="{28A0092B-C50C-407E-A947-70E740481C1C}">
-                <a14:useLocalDpi xmlns:a14="http://schemas.microsoft.com/office/drawing/2010/main" val="0"/>
-              </a:ext>
-            </a:extLst>
-          </a:blip>
           <a:srcRect l="6010" t="4540" b="3824"/>
           <a:stretch/>
         </p:blipFill>
         <p:spPr>
           <a:xfrm>
-            <a:off x="888112" y="1993391"/>
-            <a:ext cx="4346861" cy="2357051"/>
-          </a:xfrm>
-          <a:prstGeom prst="rect">
-            <a:avLst/>
-          </a:prstGeom>
-        </p:spPr>
-      </p:pic>
-      <p:pic>
-        <p:nvPicPr>
-          <p:cNvPr id="6" name="Content Placeholder 6" descr="Diagram&#10;&#10;Description automatically generated">
-            <a:extLst>
-              <a:ext uri="{FF2B5EF4-FFF2-40B4-BE49-F238E27FC236}">
-                <a16:creationId xmlns:a16="http://schemas.microsoft.com/office/drawing/2014/main" id="{55B806EB-5B9B-4A5D-AC28-E966EEFFBEE4}"/>
-              </a:ext>
-            </a:extLst>
-          </p:cNvPr>
-          <p:cNvPicPr>
-            <a:picLocks noChangeAspect="1"/>
-          </p:cNvPicPr>
-          <p:nvPr/>
-        </p:nvPicPr>
-        <p:blipFill>
-          <a:blip r:embed="rId4">
-            <a:extLst>
-              <a:ext uri="{28A0092B-C50C-407E-A947-70E740481C1C}">
-                <a14:useLocalDpi xmlns:a14="http://schemas.microsoft.com/office/drawing/2010/main" val="0"/>
-              </a:ext>
-            </a:extLst>
-          </a:blip>
-          <a:stretch>
-            <a:fillRect/>
-          </a:stretch>
-        </p:blipFill>
-        <p:spPr>
-          <a:xfrm>
-            <a:off x="5856765" y="3619038"/>
-            <a:ext cx="4597197" cy="2325154"/>
+            <a:off x="6401944" y="2323494"/>
+            <a:ext cx="5156072" cy="2795839"/>
           </a:xfrm>
           <a:prstGeom prst="rect">
             <a:avLst/>
@@ -5706,7 +5570,471 @@
 </p:sld>
 </file>
 
-<file path=ppt/slides/slide21.xml><?xml version="1.0" encoding="utf-8"?>
+<file path=ppt/slides/slide2.xml><?xml version="1.0" encoding="utf-8"?>
+<p:sld xmlns:a="http://schemas.openxmlformats.org/drawingml/2006/main" xmlns:r="http://schemas.openxmlformats.org/officeDocument/2006/relationships" xmlns:p="http://schemas.openxmlformats.org/presentationml/2006/main">
+  <p:cSld>
+    <p:bg>
+      <p:bgPr>
+        <a:solidFill>
+          <a:schemeClr val="bg1"/>
+        </a:solidFill>
+        <a:effectLst/>
+      </p:bgPr>
+    </p:bg>
+    <p:spTree>
+      <p:nvGrpSpPr>
+        <p:cNvPr id="1" name=""/>
+        <p:cNvGrpSpPr/>
+        <p:nvPr/>
+      </p:nvGrpSpPr>
+      <p:grpSpPr>
+        <a:xfrm>
+          <a:off x="0" y="0"/>
+          <a:ext cx="0" cy="0"/>
+          <a:chOff x="0" y="0"/>
+          <a:chExt cx="0" cy="0"/>
+        </a:xfrm>
+      </p:grpSpPr>
+      <p:sp useBgFill="1">
+        <p:nvSpPr>
+          <p:cNvPr id="16" name="Rectangle 15">
+            <a:extLst>
+              <a:ext uri="{FF2B5EF4-FFF2-40B4-BE49-F238E27FC236}">
+                <a16:creationId xmlns:a16="http://schemas.microsoft.com/office/drawing/2014/main" id="{72018E1B-E0B9-4440-AFF3-4112E50A2763}"/>
+              </a:ext>
+              <a:ext uri="{C183D7F6-B498-43B3-948B-1728B52AA6E4}">
+                <adec:decorative xmlns:adec="http://schemas.microsoft.com/office/drawing/2017/decorative" val="1"/>
+              </a:ext>
+            </a:extLst>
+          </p:cNvPr>
+          <p:cNvSpPr>
+            <a:spLocks noGrp="1" noRot="1" noChangeAspect="1" noMove="1" noResize="1" noEditPoints="1" noAdjustHandles="1" noChangeArrowheads="1" noChangeShapeType="1" noTextEdit="1"/>
+          </p:cNvSpPr>
+          <p:nvPr>
+            <p:extLst>
+              <p:ext uri="{386F3935-93C4-4BCD-93E2-E3B085C9AB24}">
+                <p16:designElem xmlns:p16="http://schemas.microsoft.com/office/powerpoint/2015/main" val="1"/>
+              </p:ext>
+            </p:extLst>
+          </p:nvPr>
+        </p:nvSpPr>
+        <p:spPr>
+          <a:xfrm>
+            <a:off x="-1" y="0"/>
+            <a:ext cx="12188952" cy="6858000"/>
+          </a:xfrm>
+          <a:prstGeom prst="rect">
+            <a:avLst/>
+          </a:prstGeom>
+          <a:ln>
+            <a:noFill/>
+          </a:ln>
+        </p:spPr>
+        <p:style>
+          <a:lnRef idx="2">
+            <a:schemeClr val="accent1">
+              <a:shade val="50000"/>
+            </a:schemeClr>
+          </a:lnRef>
+          <a:fillRef idx="1">
+            <a:schemeClr val="accent1"/>
+          </a:fillRef>
+          <a:effectRef idx="0">
+            <a:schemeClr val="accent1"/>
+          </a:effectRef>
+          <a:fontRef idx="minor">
+            <a:schemeClr val="lt1"/>
+          </a:fontRef>
+        </p:style>
+        <p:txBody>
+          <a:bodyPr rtlCol="0" anchor="ctr"/>
+          <a:lstStyle/>
+          <a:p>
+            <a:pPr algn="ctr"/>
+            <a:endParaRPr lang="en-US"/>
+          </a:p>
+        </p:txBody>
+      </p:sp>
+      <p:sp>
+        <p:nvSpPr>
+          <p:cNvPr id="2" name="Title 1">
+            <a:extLst>
+              <a:ext uri="{FF2B5EF4-FFF2-40B4-BE49-F238E27FC236}">
+                <a16:creationId xmlns:a16="http://schemas.microsoft.com/office/drawing/2014/main" id="{6333E71F-A146-4372-AD88-36C62F0E54A7}"/>
+              </a:ext>
+            </a:extLst>
+          </p:cNvPr>
+          <p:cNvSpPr>
+            <a:spLocks noGrp="1"/>
+          </p:cNvSpPr>
+          <p:nvPr>
+            <p:ph type="title"/>
+          </p:nvPr>
+        </p:nvSpPr>
+        <p:spPr>
+          <a:xfrm>
+            <a:off x="838200" y="386143"/>
+            <a:ext cx="10515600" cy="1840010"/>
+          </a:xfrm>
+        </p:spPr>
+        <p:txBody>
+          <a:bodyPr vert="horz" lIns="91440" tIns="45720" rIns="91440" bIns="45720" rtlCol="0" anchor="ctr">
+            <a:normAutofit/>
+          </a:bodyPr>
+          <a:lstStyle/>
+          <a:p>
+            <a:r>
+              <a:rPr lang="en-US" sz="7200" kern="1200" dirty="0">
+                <a:solidFill>
+                  <a:schemeClr val="tx1"/>
+                </a:solidFill>
+                <a:latin typeface="Bebas Neue" panose="020B0606020202050201" pitchFamily="34" charset="0"/>
+              </a:rPr>
+              <a:t>Wie </a:t>
+            </a:r>
+            <a:r>
+              <a:rPr lang="en-US" sz="7200" kern="1200" dirty="0" err="1">
+                <a:solidFill>
+                  <a:schemeClr val="tx1"/>
+                </a:solidFill>
+                <a:latin typeface="Bebas Neue" panose="020B0606020202050201" pitchFamily="34" charset="0"/>
+              </a:rPr>
+              <a:t>zijn</a:t>
+            </a:r>
+            <a:r>
+              <a:rPr lang="en-US" sz="7200" kern="1200" dirty="0">
+                <a:solidFill>
+                  <a:schemeClr val="tx1"/>
+                </a:solidFill>
+                <a:latin typeface="Bebas Neue" panose="020B0606020202050201" pitchFamily="34" charset="0"/>
+              </a:rPr>
+              <a:t> </a:t>
+            </a:r>
+            <a:r>
+              <a:rPr lang="en-US" sz="7200" kern="1200" dirty="0" err="1">
+                <a:solidFill>
+                  <a:schemeClr val="tx1"/>
+                </a:solidFill>
+                <a:latin typeface="Bebas Neue" panose="020B0606020202050201" pitchFamily="34" charset="0"/>
+              </a:rPr>
+              <a:t>wij</a:t>
+            </a:r>
+            <a:r>
+              <a:rPr lang="en-US" sz="7200" kern="1200" dirty="0">
+                <a:solidFill>
+                  <a:schemeClr val="tx1"/>
+                </a:solidFill>
+                <a:latin typeface="Bebas Neue" panose="020B0606020202050201" pitchFamily="34" charset="0"/>
+              </a:rPr>
+              <a:t>?</a:t>
+            </a:r>
+          </a:p>
+        </p:txBody>
+      </p:sp>
+      <p:pic>
+        <p:nvPicPr>
+          <p:cNvPr id="5" name="Content Placeholder 4" descr="A person with curly hair&#10;&#10;Description automatically generated with low confidence">
+            <a:extLst>
+              <a:ext uri="{FF2B5EF4-FFF2-40B4-BE49-F238E27FC236}">
+                <a16:creationId xmlns:a16="http://schemas.microsoft.com/office/drawing/2014/main" id="{E82E6C44-7EA1-4FA0-A7E6-70B90FD6021C}"/>
+              </a:ext>
+            </a:extLst>
+          </p:cNvPr>
+          <p:cNvPicPr>
+            <a:picLocks noGrp="1" noChangeAspect="1"/>
+          </p:cNvPicPr>
+          <p:nvPr>
+            <p:ph idx="1"/>
+          </p:nvPr>
+        </p:nvPicPr>
+        <p:blipFill rotWithShape="1">
+          <a:blip r:embed="rId2">
+            <a:extLst>
+              <a:ext uri="{28A0092B-C50C-407E-A947-70E740481C1C}">
+                <a14:useLocalDpi xmlns:a14="http://schemas.microsoft.com/office/drawing/2010/main" val="0"/>
+              </a:ext>
+            </a:extLst>
+          </a:blip>
+          <a:srcRect l="2225"/>
+          <a:stretch/>
+        </p:blipFill>
+        <p:spPr>
+          <a:xfrm>
+            <a:off x="587399" y="2226153"/>
+            <a:ext cx="2326834" cy="3070688"/>
+          </a:xfrm>
+          <a:prstGeom prst="rect">
+            <a:avLst/>
+          </a:prstGeom>
+        </p:spPr>
+      </p:pic>
+      <p:pic>
+        <p:nvPicPr>
+          <p:cNvPr id="11" name="Picture 10" descr="A person smiling for the camera&#10;&#10;Description automatically generated with medium confidence">
+            <a:extLst>
+              <a:ext uri="{FF2B5EF4-FFF2-40B4-BE49-F238E27FC236}">
+                <a16:creationId xmlns:a16="http://schemas.microsoft.com/office/drawing/2014/main" id="{8241B7D5-3613-4C44-9E19-CB51FB1CB98E}"/>
+              </a:ext>
+            </a:extLst>
+          </p:cNvPr>
+          <p:cNvPicPr>
+            <a:picLocks noChangeAspect="1"/>
+          </p:cNvPicPr>
+          <p:nvPr/>
+        </p:nvPicPr>
+        <p:blipFill rotWithShape="1">
+          <a:blip r:embed="rId3">
+            <a:extLst>
+              <a:ext uri="{28A0092B-C50C-407E-A947-70E740481C1C}">
+                <a14:useLocalDpi xmlns:a14="http://schemas.microsoft.com/office/drawing/2010/main" val="0"/>
+              </a:ext>
+            </a:extLst>
+          </a:blip>
+          <a:srcRect l="306" r="1922" b="3"/>
+          <a:stretch/>
+        </p:blipFill>
+        <p:spPr>
+          <a:xfrm>
+            <a:off x="3496665" y="2226153"/>
+            <a:ext cx="2326834" cy="3070688"/>
+          </a:xfrm>
+          <a:prstGeom prst="rect">
+            <a:avLst/>
+          </a:prstGeom>
+        </p:spPr>
+      </p:pic>
+      <p:pic>
+        <p:nvPicPr>
+          <p:cNvPr id="7" name="Picture 6" descr="A person smiling for the camera&#10;&#10;Description automatically generated with medium confidence">
+            <a:extLst>
+              <a:ext uri="{FF2B5EF4-FFF2-40B4-BE49-F238E27FC236}">
+                <a16:creationId xmlns:a16="http://schemas.microsoft.com/office/drawing/2014/main" id="{BBCA21E5-9850-4AAD-BBA8-CC7E422D66CE}"/>
+              </a:ext>
+            </a:extLst>
+          </p:cNvPr>
+          <p:cNvPicPr>
+            <a:picLocks noChangeAspect="1"/>
+          </p:cNvPicPr>
+          <p:nvPr/>
+        </p:nvPicPr>
+        <p:blipFill rotWithShape="1">
+          <a:blip r:embed="rId4">
+            <a:extLst>
+              <a:ext uri="{28A0092B-C50C-407E-A947-70E740481C1C}">
+                <a14:useLocalDpi xmlns:a14="http://schemas.microsoft.com/office/drawing/2010/main" val="0"/>
+              </a:ext>
+            </a:extLst>
+          </a:blip>
+          <a:srcRect l="2225" r="3" b="3"/>
+          <a:stretch/>
+        </p:blipFill>
+        <p:spPr>
+          <a:xfrm>
+            <a:off x="6405931" y="2226153"/>
+            <a:ext cx="2326834" cy="3070688"/>
+          </a:xfrm>
+          <a:prstGeom prst="rect">
+            <a:avLst/>
+          </a:prstGeom>
+        </p:spPr>
+      </p:pic>
+      <p:pic>
+        <p:nvPicPr>
+          <p:cNvPr id="9" name="Picture 8" descr="A person smiling outside&#10;&#10;Description automatically generated with low confidence">
+            <a:extLst>
+              <a:ext uri="{FF2B5EF4-FFF2-40B4-BE49-F238E27FC236}">
+                <a16:creationId xmlns:a16="http://schemas.microsoft.com/office/drawing/2014/main" id="{03234BE0-2E76-48DA-AE9E-A9D68B277F26}"/>
+              </a:ext>
+            </a:extLst>
+          </p:cNvPr>
+          <p:cNvPicPr>
+            <a:picLocks noChangeAspect="1"/>
+          </p:cNvPicPr>
+          <p:nvPr/>
+        </p:nvPicPr>
+        <p:blipFill rotWithShape="1">
+          <a:blip r:embed="rId5">
+            <a:extLst>
+              <a:ext uri="{28A0092B-C50C-407E-A947-70E740481C1C}">
+                <a14:useLocalDpi xmlns:a14="http://schemas.microsoft.com/office/drawing/2010/main" val="0"/>
+              </a:ext>
+            </a:extLst>
+          </a:blip>
+          <a:srcRect l="6261" r="22508" b="-2"/>
+          <a:stretch/>
+        </p:blipFill>
+        <p:spPr>
+          <a:xfrm>
+            <a:off x="9315196" y="2226153"/>
+            <a:ext cx="2326834" cy="3070688"/>
+          </a:xfrm>
+          <a:prstGeom prst="rect">
+            <a:avLst/>
+          </a:prstGeom>
+        </p:spPr>
+      </p:pic>
+      <p:sp>
+        <p:nvSpPr>
+          <p:cNvPr id="12" name="TextBox 11">
+            <a:extLst>
+              <a:ext uri="{FF2B5EF4-FFF2-40B4-BE49-F238E27FC236}">
+                <a16:creationId xmlns:a16="http://schemas.microsoft.com/office/drawing/2014/main" id="{8745C667-21B6-4572-BD84-0CFCFA11B8FB}"/>
+              </a:ext>
+            </a:extLst>
+          </p:cNvPr>
+          <p:cNvSpPr txBox="1"/>
+          <p:nvPr/>
+        </p:nvSpPr>
+        <p:spPr>
+          <a:xfrm>
+            <a:off x="668914" y="5548586"/>
+            <a:ext cx="2172502" cy="369332"/>
+          </a:xfrm>
+          <a:prstGeom prst="rect">
+            <a:avLst/>
+          </a:prstGeom>
+          <a:noFill/>
+        </p:spPr>
+        <p:txBody>
+          <a:bodyPr wrap="square" rtlCol="0">
+            <a:spAutoFit/>
+          </a:bodyPr>
+          <a:lstStyle/>
+          <a:p>
+            <a:pPr algn="ctr"/>
+            <a:r>
+              <a:rPr lang="nl-NL" dirty="0"/>
+              <a:t>Egbert-Jan Terpstra</a:t>
+            </a:r>
+            <a:endParaRPr lang="en-NL" dirty="0"/>
+          </a:p>
+        </p:txBody>
+      </p:sp>
+      <p:sp>
+        <p:nvSpPr>
+          <p:cNvPr id="14" name="TextBox 13">
+            <a:extLst>
+              <a:ext uri="{FF2B5EF4-FFF2-40B4-BE49-F238E27FC236}">
+                <a16:creationId xmlns:a16="http://schemas.microsoft.com/office/drawing/2014/main" id="{C4C087DF-F75F-475C-BEAC-DDA29D7EEE1F}"/>
+              </a:ext>
+            </a:extLst>
+          </p:cNvPr>
+          <p:cNvSpPr txBox="1"/>
+          <p:nvPr/>
+        </p:nvSpPr>
+        <p:spPr>
+          <a:xfrm>
+            <a:off x="3496665" y="5566384"/>
+            <a:ext cx="2172502" cy="369332"/>
+          </a:xfrm>
+          <a:prstGeom prst="rect">
+            <a:avLst/>
+          </a:prstGeom>
+          <a:noFill/>
+        </p:spPr>
+        <p:txBody>
+          <a:bodyPr wrap="square" rtlCol="0">
+            <a:spAutoFit/>
+          </a:bodyPr>
+          <a:lstStyle/>
+          <a:p>
+            <a:pPr algn="ctr"/>
+            <a:r>
+              <a:rPr lang="nl-NL" dirty="0"/>
+              <a:t>Sem Hones</a:t>
+            </a:r>
+            <a:endParaRPr lang="en-NL" dirty="0"/>
+          </a:p>
+        </p:txBody>
+      </p:sp>
+      <p:sp>
+        <p:nvSpPr>
+          <p:cNvPr id="15" name="TextBox 14">
+            <a:extLst>
+              <a:ext uri="{FF2B5EF4-FFF2-40B4-BE49-F238E27FC236}">
+                <a16:creationId xmlns:a16="http://schemas.microsoft.com/office/drawing/2014/main" id="{4012EBA7-3385-4299-BA95-4E88D5A0B77A}"/>
+              </a:ext>
+            </a:extLst>
+          </p:cNvPr>
+          <p:cNvSpPr txBox="1"/>
+          <p:nvPr/>
+        </p:nvSpPr>
+        <p:spPr>
+          <a:xfrm>
+            <a:off x="6560263" y="5566384"/>
+            <a:ext cx="2172502" cy="369332"/>
+          </a:xfrm>
+          <a:prstGeom prst="rect">
+            <a:avLst/>
+          </a:prstGeom>
+          <a:noFill/>
+        </p:spPr>
+        <p:txBody>
+          <a:bodyPr wrap="square" rtlCol="0">
+            <a:spAutoFit/>
+          </a:bodyPr>
+          <a:lstStyle/>
+          <a:p>
+            <a:pPr algn="ctr"/>
+            <a:r>
+              <a:rPr lang="nl-NL" dirty="0"/>
+              <a:t>Dennis Vlaanderen</a:t>
+            </a:r>
+            <a:endParaRPr lang="en-NL" dirty="0"/>
+          </a:p>
+        </p:txBody>
+      </p:sp>
+      <p:sp>
+        <p:nvSpPr>
+          <p:cNvPr id="17" name="TextBox 16">
+            <a:extLst>
+              <a:ext uri="{FF2B5EF4-FFF2-40B4-BE49-F238E27FC236}">
+                <a16:creationId xmlns:a16="http://schemas.microsoft.com/office/drawing/2014/main" id="{B877481F-BBC4-47EE-B309-AC618DB5B8E0}"/>
+              </a:ext>
+            </a:extLst>
+          </p:cNvPr>
+          <p:cNvSpPr txBox="1"/>
+          <p:nvPr/>
+        </p:nvSpPr>
+        <p:spPr>
+          <a:xfrm>
+            <a:off x="9392362" y="5566384"/>
+            <a:ext cx="2172502" cy="369332"/>
+          </a:xfrm>
+          <a:prstGeom prst="rect">
+            <a:avLst/>
+          </a:prstGeom>
+          <a:noFill/>
+        </p:spPr>
+        <p:txBody>
+          <a:bodyPr wrap="square" rtlCol="0">
+            <a:spAutoFit/>
+          </a:bodyPr>
+          <a:lstStyle/>
+          <a:p>
+            <a:pPr algn="ctr"/>
+            <a:r>
+              <a:rPr lang="nl-NL" dirty="0"/>
+              <a:t>Thom Kraaijvanger</a:t>
+            </a:r>
+            <a:endParaRPr lang="en-NL" dirty="0"/>
+          </a:p>
+        </p:txBody>
+      </p:sp>
+    </p:spTree>
+    <p:extLst>
+      <p:ext uri="{BB962C8B-B14F-4D97-AF65-F5344CB8AC3E}">
+        <p14:creationId xmlns:p14="http://schemas.microsoft.com/office/powerpoint/2010/main" val="3702475179"/>
+      </p:ext>
+    </p:extLst>
+  </p:cSld>
+  <p:clrMapOvr>
+    <a:masterClrMapping/>
+  </p:clrMapOvr>
+</p:sld>
+</file>
+
+<file path=ppt/slides/slide20.xml><?xml version="1.0" encoding="utf-8"?>
 <p:sld xmlns:a="http://schemas.openxmlformats.org/drawingml/2006/main" xmlns:r="http://schemas.openxmlformats.org/officeDocument/2006/relationships" xmlns:p="http://schemas.openxmlformats.org/presentationml/2006/main">
   <p:cSld>
     <p:spTree>
@@ -5784,8 +6112,43 @@
         </p:blipFill>
         <p:spPr>
           <a:xfrm>
-            <a:off x="1861968" y="2017261"/>
-            <a:ext cx="8468063" cy="3598650"/>
+            <a:off x="5066515" y="3546273"/>
+            <a:ext cx="6672904" cy="2835766"/>
+          </a:xfrm>
+          <a:prstGeom prst="rect">
+            <a:avLst/>
+          </a:prstGeom>
+        </p:spPr>
+      </p:pic>
+      <p:pic>
+        <p:nvPicPr>
+          <p:cNvPr id="5" name="Content Placeholder 6" descr="Diagram&#10;&#10;Description automatically generated">
+            <a:extLst>
+              <a:ext uri="{FF2B5EF4-FFF2-40B4-BE49-F238E27FC236}">
+                <a16:creationId xmlns:a16="http://schemas.microsoft.com/office/drawing/2014/main" id="{798B8123-EEAB-4E66-9B91-ED0187489595}"/>
+              </a:ext>
+            </a:extLst>
+          </p:cNvPr>
+          <p:cNvPicPr>
+            <a:picLocks noChangeAspect="1"/>
+          </p:cNvPicPr>
+          <p:nvPr/>
+        </p:nvPicPr>
+        <p:blipFill rotWithShape="1">
+          <a:blip r:embed="rId3">
+            <a:extLst>
+              <a:ext uri="{28A0092B-C50C-407E-A947-70E740481C1C}">
+                <a14:useLocalDpi xmlns:a14="http://schemas.microsoft.com/office/drawing/2010/main" val="0"/>
+              </a:ext>
+            </a:extLst>
+          </a:blip>
+          <a:srcRect r="9161" b="15904"/>
+          <a:stretch/>
+        </p:blipFill>
+        <p:spPr>
+          <a:xfrm>
+            <a:off x="294349" y="1477819"/>
+            <a:ext cx="5543033" cy="2595418"/>
           </a:xfrm>
           <a:prstGeom prst="rect">
             <a:avLst/>
@@ -5888,6 +6251,75 @@
 </p:sld>
 </file>
 
+<file path=ppt/slides/slide21.xml><?xml version="1.0" encoding="utf-8"?>
+<p:sld xmlns:a="http://schemas.openxmlformats.org/drawingml/2006/main" xmlns:r="http://schemas.openxmlformats.org/officeDocument/2006/relationships" xmlns:p="http://schemas.openxmlformats.org/presentationml/2006/main">
+  <p:cSld>
+    <p:spTree>
+      <p:nvGrpSpPr>
+        <p:cNvPr id="1" name=""/>
+        <p:cNvGrpSpPr/>
+        <p:nvPr/>
+      </p:nvGrpSpPr>
+      <p:grpSpPr>
+        <a:xfrm>
+          <a:off x="0" y="0"/>
+          <a:ext cx="0" cy="0"/>
+          <a:chOff x="0" y="0"/>
+          <a:chExt cx="0" cy="0"/>
+        </a:xfrm>
+      </p:grpSpPr>
+      <p:sp>
+        <p:nvSpPr>
+          <p:cNvPr id="2" name="Titel 1">
+            <a:extLst>
+              <a:ext uri="{FF2B5EF4-FFF2-40B4-BE49-F238E27FC236}">
+                <a16:creationId xmlns:a16="http://schemas.microsoft.com/office/drawing/2014/main" id="{C2CAD292-74AC-4BAB-A5A1-03F60B732B5E}"/>
+              </a:ext>
+            </a:extLst>
+          </p:cNvPr>
+          <p:cNvSpPr>
+            <a:spLocks noGrp="1"/>
+          </p:cNvSpPr>
+          <p:nvPr>
+            <p:ph type="title"/>
+          </p:nvPr>
+        </p:nvSpPr>
+        <p:spPr>
+          <a:xfrm>
+            <a:off x="838200" y="2766218"/>
+            <a:ext cx="10515600" cy="1325563"/>
+          </a:xfrm>
+        </p:spPr>
+        <p:txBody>
+          <a:bodyPr>
+            <a:normAutofit/>
+          </a:bodyPr>
+          <a:lstStyle/>
+          <a:p>
+            <a:pPr algn="ctr"/>
+            <a:r>
+              <a:rPr lang="en-GB" sz="8000" dirty="0">
+                <a:latin typeface="Bebas Neue" panose="020B0606020202050201" pitchFamily="34" charset="0"/>
+              </a:rPr>
+              <a:t>PAUZE</a:t>
+            </a:r>
+            <a:endParaRPr lang="nl-NL" sz="8000" dirty="0"/>
+          </a:p>
+        </p:txBody>
+      </p:sp>
+    </p:spTree>
+    <p:extLst>
+      <p:ext uri="{BB962C8B-B14F-4D97-AF65-F5344CB8AC3E}">
+        <p14:creationId xmlns:p14="http://schemas.microsoft.com/office/powerpoint/2010/main" val="4202426212"/>
+      </p:ext>
+    </p:extLst>
+  </p:cSld>
+  <p:clrMapOvr>
+    <a:masterClrMapping/>
+  </p:clrMapOvr>
+</p:sld>
+</file>
+
 <file path=ppt/slides/slide3.xml><?xml version="1.0" encoding="utf-8"?>
 <p:sld xmlns:a="http://schemas.openxmlformats.org/drawingml/2006/main" xmlns:r="http://schemas.openxmlformats.org/officeDocument/2006/relationships" xmlns:p="http://schemas.openxmlformats.org/presentationml/2006/main">
   <p:cSld>
@@ -5962,24 +6394,39 @@
           <a:lstStyle/>
           <a:p>
             <a:r>
-              <a:rPr lang="en-GB" dirty="0"/>
+              <a:rPr lang="en-GB" dirty="0">
+                <a:latin typeface="Bahnschrift SemiBold" panose="020B0502040204020203" pitchFamily="34" charset="0"/>
+                <a:cs typeface="Aharoni" panose="02010803020104030203" pitchFamily="2" charset="-79"/>
+              </a:rPr>
               <a:t>Wat is Camunda</a:t>
             </a:r>
           </a:p>
           <a:p>
             <a:r>
-              <a:rPr lang="en-GB" dirty="0"/>
+              <a:rPr lang="en-GB" dirty="0">
+                <a:latin typeface="Bahnschrift SemiBold" panose="020B0502040204020203" pitchFamily="34" charset="0"/>
+                <a:cs typeface="Aharoni" panose="02010803020104030203" pitchFamily="2" charset="-79"/>
+              </a:rPr>
               <a:t>Code </a:t>
             </a:r>
             <a:r>
-              <a:rPr lang="en-GB" dirty="0" err="1"/>
+              <a:rPr lang="en-GB" dirty="0" err="1">
+                <a:latin typeface="Bahnschrift SemiBold" panose="020B0502040204020203" pitchFamily="34" charset="0"/>
+                <a:cs typeface="Aharoni" panose="02010803020104030203" pitchFamily="2" charset="-79"/>
+              </a:rPr>
               <a:t>voorbeelden</a:t>
             </a:r>
-            <a:endParaRPr lang="en-GB" dirty="0"/>
-          </a:p>
-          <a:p>
-            <a:r>
-              <a:rPr lang="en-GB" dirty="0"/>
+            <a:endParaRPr lang="en-GB" dirty="0">
+              <a:latin typeface="Bahnschrift SemiBold" panose="020B0502040204020203" pitchFamily="34" charset="0"/>
+              <a:cs typeface="Aharoni" panose="02010803020104030203" pitchFamily="2" charset="-79"/>
+            </a:endParaRPr>
+          </a:p>
+          <a:p>
+            <a:r>
+              <a:rPr lang="en-GB" dirty="0">
+                <a:latin typeface="Bahnschrift SemiBold" panose="020B0502040204020203" pitchFamily="34" charset="0"/>
+                <a:cs typeface="Aharoni" panose="02010803020104030203" pitchFamily="2" charset="-79"/>
+              </a:rPr>
               <a:t>Deployment</a:t>
             </a:r>
           </a:p>
@@ -6048,24 +6495,30 @@
           <a:p>
             <a:pPr algn="ctr"/>
             <a:r>
-              <a:rPr lang="nl-NL" sz="3200" i="1" dirty="0"/>
+              <a:rPr lang="nl-NL" sz="3200" dirty="0">
+                <a:latin typeface="Bahnschrift SemiBold" panose="020B0502040204020203" pitchFamily="34" charset="0"/>
+              </a:rPr>
               <a:t>“</a:t>
             </a:r>
             <a:r>
-              <a:rPr lang="nl-NL" sz="3200" b="0" i="1" dirty="0">
+              <a:rPr lang="nl-NL" sz="3200" b="0" dirty="0">
                 <a:solidFill>
                   <a:srgbClr val="202124"/>
                 </a:solidFill>
                 <a:effectLst/>
-                <a:latin typeface="-apple-system"/>
+                <a:latin typeface="Bahnschrift SemiBold" panose="020B0502040204020203" pitchFamily="34" charset="0"/>
               </a:rPr>
               <a:t>Op basis van Spring Framework en Camunda een reeds bestaande op traditionele wijze ontwikkelde en ingerichte workflow inrichten.</a:t>
             </a:r>
             <a:r>
-              <a:rPr lang="nl-NL" sz="3200" i="1" dirty="0"/>
+              <a:rPr lang="nl-NL" sz="3200" dirty="0">
+                <a:latin typeface="Bahnschrift SemiBold" panose="020B0502040204020203" pitchFamily="34" charset="0"/>
+              </a:rPr>
               <a:t>”</a:t>
             </a:r>
-            <a:endParaRPr lang="en-NL" sz="3200" i="1" dirty="0"/>
+            <a:endParaRPr lang="en-NL" sz="3200" dirty="0">
+              <a:latin typeface="Bahnschrift SemiBold" panose="020B0502040204020203" pitchFamily="34" charset="0"/>
+            </a:endParaRPr>
           </a:p>
         </p:txBody>
       </p:sp>
@@ -6099,18 +6552,26 @@
           <a:p>
             <a:pPr algn="ctr"/>
             <a:r>
-              <a:rPr lang="nl-NL" sz="3200" i="1" dirty="0"/>
+              <a:rPr lang="nl-NL" sz="3200" dirty="0">
+                <a:latin typeface="Bahnschrift SemiBold" panose="020B0502040204020203" pitchFamily="34" charset="0"/>
+              </a:rPr>
               <a:t>“Zodat wij vervolgens de beide implementaties met elkaar kunnen vergelijken en </a:t>
             </a:r>
             <a:r>
-              <a:rPr lang="nl-NL" sz="3200" i="1" dirty="0" err="1"/>
+              <a:rPr lang="nl-NL" sz="3200" dirty="0" err="1">
+                <a:latin typeface="Bahnschrift SemiBold" panose="020B0502040204020203" pitchFamily="34" charset="0"/>
+              </a:rPr>
               <a:t>learnings</a:t>
             </a:r>
             <a:r>
-              <a:rPr lang="nl-NL" sz="3200" i="1" dirty="0"/>
+              <a:rPr lang="nl-NL" sz="3200" dirty="0">
+                <a:latin typeface="Bahnschrift SemiBold" panose="020B0502040204020203" pitchFamily="34" charset="0"/>
+              </a:rPr>
               <a:t> te kunnen destilleren.”</a:t>
             </a:r>
-            <a:endParaRPr lang="en-NL" sz="4800" i="1" dirty="0"/>
+            <a:endParaRPr lang="en-NL" sz="4800" dirty="0">
+              <a:latin typeface="Bahnschrift SemiBold" panose="020B0502040204020203" pitchFamily="34" charset="0"/>
+            </a:endParaRPr>
           </a:p>
         </p:txBody>
       </p:sp>
@@ -6283,38 +6744,44 @@
           </a:xfrm>
         </p:spPr>
         <p:txBody>
-          <a:bodyPr/>
+          <a:bodyPr>
+            <a:normAutofit fontScale="92500"/>
+          </a:bodyPr>
           <a:lstStyle/>
           <a:p>
             <a:pPr marL="0" indent="0">
               <a:buNone/>
             </a:pPr>
             <a:r>
-              <a:rPr lang="nl-NL" i="1" dirty="0"/>
+              <a:rPr lang="nl-NL" dirty="0">
+                <a:latin typeface="Bahnschrift SemiBold" panose="020B0502040204020203" pitchFamily="34" charset="0"/>
+              </a:rPr>
               <a:t>‘Universal </a:t>
             </a:r>
             <a:r>
-              <a:rPr lang="nl-NL" i="1" dirty="0" err="1"/>
+              <a:rPr lang="nl-NL" dirty="0" err="1">
+                <a:latin typeface="Bahnschrift SemiBold" panose="020B0502040204020203" pitchFamily="34" charset="0"/>
+              </a:rPr>
               <a:t>Process</a:t>
             </a:r>
             <a:r>
-              <a:rPr lang="nl-NL" i="1" dirty="0"/>
+              <a:rPr lang="nl-NL" dirty="0">
+                <a:latin typeface="Bahnschrift SemiBold" panose="020B0502040204020203" pitchFamily="34" charset="0"/>
+              </a:rPr>
               <a:t> </a:t>
             </a:r>
             <a:r>
-              <a:rPr lang="nl-NL" i="1" dirty="0" err="1"/>
+              <a:rPr lang="nl-NL" dirty="0" err="1">
+                <a:latin typeface="Bahnschrift SemiBold" panose="020B0502040204020203" pitchFamily="34" charset="0"/>
+              </a:rPr>
               <a:t>Orchestrator</a:t>
             </a:r>
             <a:r>
-              <a:rPr lang="nl-NL" i="1" dirty="0"/>
+              <a:rPr lang="nl-NL" dirty="0">
+                <a:latin typeface="Bahnschrift SemiBold" panose="020B0502040204020203" pitchFamily="34" charset="0"/>
+              </a:rPr>
               <a:t>’</a:t>
             </a:r>
-          </a:p>
-          <a:p>
-            <a:pPr marL="0" indent="0">
-              <a:buNone/>
-            </a:pPr>
-            <a:endParaRPr lang="nl-NL" dirty="0"/>
           </a:p>
         </p:txBody>
       </p:sp>
@@ -6555,7 +7022,9 @@
               <a:buNone/>
             </a:pPr>
             <a:r>
-              <a:rPr lang="nl-NL" dirty="0"/>
+              <a:rPr lang="nl-NL" dirty="0">
+                <a:latin typeface="Bahnschrift SemiBold" panose="020B0502040204020203" pitchFamily="34" charset="0"/>
+              </a:rPr>
               <a:t>Workflow Automatisering</a:t>
             </a:r>
           </a:p>
@@ -6586,7 +7055,7 @@
         </p:spPr>
         <p:txBody>
           <a:bodyPr vert="horz" lIns="91440" tIns="45720" rIns="91440" bIns="45720" rtlCol="0">
-            <a:normAutofit/>
+            <a:normAutofit fontScale="92500"/>
           </a:bodyPr>
           <a:lstStyle>
             <a:lvl1pPr marL="228600" indent="-228600" algn="l" defTabSz="914400" rtl="0" eaLnBrk="1" latinLnBrk="0" hangingPunct="1">
@@ -6758,7 +7227,9 @@
               <a:buNone/>
             </a:pPr>
             <a:r>
-              <a:rPr lang="nl-NL" dirty="0"/>
+              <a:rPr lang="nl-NL" dirty="0">
+                <a:latin typeface="Bahnschrift SemiBold" panose="020B0502040204020203" pitchFamily="34" charset="0"/>
+              </a:rPr>
               <a:t>BPMN-</a:t>
             </a:r>
           </a:p>

</xml_diff>